<commit_message>
S1-Introduction to technical analysis
</commit_message>
<xml_diff>
--- a/Slides/1-Introduction to technical analysis.pptx
+++ b/Slides/1-Introduction to technical analysis.pptx
@@ -1558,6 +1558,353 @@
 </p:notes>
 </file>
 
+<file path=ppt/notesSlides/notesSlide18.xml><?xml version="1.0" encoding="utf-8"?>
+<p:notes xmlns:a="http://schemas.openxmlformats.org/drawingml/2006/main" xmlns:r="http://schemas.openxmlformats.org/officeDocument/2006/relationships" xmlns:p="http://schemas.openxmlformats.org/presentationml/2006/main">
+  <p:cSld>
+    <p:spTree>
+      <p:nvGrpSpPr>
+        <p:cNvPr id="1" name=""/>
+        <p:cNvGrpSpPr/>
+        <p:nvPr/>
+      </p:nvGrpSpPr>
+      <p:grpSpPr>
+        <a:xfrm>
+          <a:off x="0" y="0"/>
+          <a:ext cx="0" cy="0"/>
+          <a:chOff x="0" y="0"/>
+          <a:chExt cx="0" cy="0"/>
+        </a:xfrm>
+      </p:grpSpPr>
+      <p:sp>
+        <p:nvSpPr>
+          <p:cNvPr id="2" name="Slide Image Placeholder 1"/>
+          <p:cNvSpPr>
+            <a:spLocks noGrp="1" noRot="1" noChangeAspect="1"/>
+          </p:cNvSpPr>
+          <p:nvPr>
+            <p:ph type="sldImg"/>
+          </p:nvPr>
+        </p:nvSpPr>
+        <p:spPr/>
+      </p:sp>
+      <p:sp>
+        <p:nvSpPr>
+          <p:cNvPr id="3" name="Notes Placeholder 2"/>
+          <p:cNvSpPr>
+            <a:spLocks noGrp="1"/>
+          </p:cNvSpPr>
+          <p:nvPr>
+            <p:ph type="body" idx="1"/>
+          </p:nvPr>
+        </p:nvSpPr>
+        <p:spPr/>
+        <p:txBody>
+          <a:bodyPr/>
+          <a:lstStyle/>
+          <a:p>
+            <a:pPr algn="r" rtl="1"/>
+            <a:r>
+              <a:rPr lang="fa-IR" dirty="0" smtClean="0"/>
+              <a:t>شیب‌های</a:t>
+            </a:r>
+            <a:r>
+              <a:rPr lang="fa-IR" baseline="0" dirty="0" smtClean="0"/>
+              <a:t> زیاد معمولا ناشی از </a:t>
+            </a:r>
+            <a:r>
+              <a:rPr lang="en-US" baseline="0" dirty="0" smtClean="0"/>
+              <a:t>sentiment</a:t>
+            </a:r>
+            <a:r>
+              <a:rPr lang="fa-IR" baseline="0" dirty="0" smtClean="0"/>
+              <a:t> و اخبار هیجانی‌ست. </a:t>
+            </a:r>
+          </a:p>
+          <a:p>
+            <a:pPr algn="r" rtl="1"/>
+            <a:r>
+              <a:rPr lang="fa-IR" baseline="0" dirty="0" smtClean="0"/>
+              <a:t>برای میانگین متحرک. وقتی در قیمت نوسان داریم، برای از بین بردن این نویزها از این استفاده میکنیم.</a:t>
+            </a:r>
+          </a:p>
+          <a:p>
+            <a:pPr algn="r" rtl="1"/>
+            <a:r>
+              <a:rPr lang="fa-IR" baseline="0" dirty="0" smtClean="0"/>
+              <a:t>در این صورت میتوان </a:t>
+            </a:r>
+            <a:r>
+              <a:rPr lang="en-US" baseline="0" dirty="0" smtClean="0"/>
+              <a:t>random</a:t>
+            </a:r>
+            <a:r>
+              <a:rPr lang="fa-IR" baseline="0" dirty="0" smtClean="0"/>
+              <a:t> و </a:t>
+            </a:r>
+            <a:r>
+              <a:rPr lang="en-US" baseline="0" dirty="0" smtClean="0"/>
+              <a:t>short-term</a:t>
+            </a:r>
+            <a:r>
+              <a:rPr lang="fa-IR" baseline="0" dirty="0" smtClean="0"/>
+              <a:t> ها رو از بین ببریم. پیش‌بینی </a:t>
+            </a:r>
+            <a:r>
+              <a:rPr lang="en-US" baseline="0" dirty="0" smtClean="0"/>
+              <a:t>MA</a:t>
+            </a:r>
+            <a:r>
+              <a:rPr lang="fa-IR" baseline="0" dirty="0" smtClean="0"/>
+              <a:t> معمولا آسون‌تر از </a:t>
+            </a:r>
+            <a:r>
+              <a:rPr lang="en-US" baseline="0" dirty="0" smtClean="0"/>
+              <a:t>price</a:t>
+            </a:r>
+            <a:r>
+              <a:rPr lang="fa-IR" baseline="0" dirty="0" smtClean="0"/>
+              <a:t> و ... است. اهمیتش در اینه.</a:t>
+            </a:r>
+          </a:p>
+          <a:p>
+            <a:pPr algn="r" rtl="1"/>
+            <a:r>
+              <a:rPr lang="fa-IR" baseline="0" dirty="0" smtClean="0"/>
+              <a:t>2 نوع ازش داریم:</a:t>
+            </a:r>
+          </a:p>
+          <a:p>
+            <a:pPr algn="r" rtl="1"/>
+            <a:r>
+              <a:rPr lang="fa-IR" baseline="0" dirty="0" smtClean="0"/>
+              <a:t>1- </a:t>
+            </a:r>
+            <a:r>
+              <a:rPr lang="en-US" baseline="0" dirty="0" smtClean="0"/>
+              <a:t>SMA</a:t>
+            </a:r>
+            <a:r>
+              <a:rPr lang="fa-IR" baseline="0" dirty="0" smtClean="0"/>
+              <a:t>: از میانگین ساده به دست میاد که از میانگین 10 کندل گذشته را در نظر میگیریم و عموما </a:t>
+            </a:r>
+            <a:r>
+              <a:rPr lang="en-US" baseline="0" dirty="0" smtClean="0"/>
+              <a:t>close</a:t>
+            </a:r>
+            <a:r>
+              <a:rPr lang="fa-IR" baseline="0" dirty="0" smtClean="0"/>
+              <a:t>ش رو در نظر میگیرن. برای امروز 10 کندل میانگین به دست میاریم میشه قیمت امروز. برای دیروز هم به همین صورت و ...</a:t>
+            </a:r>
+          </a:p>
+          <a:p>
+            <a:pPr algn="r" rtl="1"/>
+            <a:r>
+              <a:rPr lang="fa-IR" baseline="0" dirty="0" smtClean="0"/>
+              <a:t>2- </a:t>
+            </a:r>
+            <a:r>
+              <a:rPr lang="en-US" baseline="0" dirty="0" smtClean="0"/>
+              <a:t>EMA</a:t>
+            </a:r>
+            <a:r>
+              <a:rPr lang="fa-IR" baseline="0" dirty="0" smtClean="0"/>
+              <a:t>: هدف کندل‌هایی که اخیرا شکل گرفتن تاثیر بیشتری داشته باشند. در </a:t>
+            </a:r>
+            <a:r>
+              <a:rPr lang="en-US" baseline="0" dirty="0" smtClean="0"/>
+              <a:t>SMA</a:t>
+            </a:r>
+            <a:r>
+              <a:rPr lang="fa-IR" baseline="0" dirty="0" smtClean="0"/>
+              <a:t> تاثیر همه کندل‌های یکی بود ولی در </a:t>
+            </a:r>
+            <a:r>
+              <a:rPr lang="en-US" baseline="0" dirty="0" smtClean="0"/>
+              <a:t>EMA</a:t>
+            </a:r>
+            <a:r>
+              <a:rPr lang="fa-IR" baseline="0" dirty="0" smtClean="0"/>
+              <a:t> در واقع کندل امروز از دیروز مهمتر است.</a:t>
+            </a:r>
+            <a:endParaRPr lang="en-US" dirty="0"/>
+          </a:p>
+        </p:txBody>
+      </p:sp>
+      <p:sp>
+        <p:nvSpPr>
+          <p:cNvPr id="4" name="Slide Number Placeholder 3"/>
+          <p:cNvSpPr>
+            <a:spLocks noGrp="1"/>
+          </p:cNvSpPr>
+          <p:nvPr>
+            <p:ph type="sldNum" sz="quarter" idx="10"/>
+          </p:nvPr>
+        </p:nvSpPr>
+        <p:spPr/>
+        <p:txBody>
+          <a:bodyPr/>
+          <a:lstStyle/>
+          <a:p>
+            <a:fld id="{A6297769-1C72-4A44-9625-ED38B62D33BE}" type="slidenum">
+              <a:rPr lang="en-US" smtClean="0"/>
+              <a:t>22</a:t>
+            </a:fld>
+            <a:endParaRPr lang="en-US"/>
+          </a:p>
+        </p:txBody>
+      </p:sp>
+    </p:spTree>
+    <p:extLst>
+      <p:ext uri="{BB962C8B-B14F-4D97-AF65-F5344CB8AC3E}">
+        <p14:creationId xmlns:p14="http://schemas.microsoft.com/office/powerpoint/2010/main" val="4227388260"/>
+      </p:ext>
+    </p:extLst>
+  </p:cSld>
+  <p:clrMapOvr>
+    <a:masterClrMapping/>
+  </p:clrMapOvr>
+</p:notes>
+</file>
+
+<file path=ppt/notesSlides/notesSlide19.xml><?xml version="1.0" encoding="utf-8"?>
+<p:notes xmlns:a="http://schemas.openxmlformats.org/drawingml/2006/main" xmlns:r="http://schemas.openxmlformats.org/officeDocument/2006/relationships" xmlns:p="http://schemas.openxmlformats.org/presentationml/2006/main">
+  <p:cSld>
+    <p:spTree>
+      <p:nvGrpSpPr>
+        <p:cNvPr id="1" name=""/>
+        <p:cNvGrpSpPr/>
+        <p:nvPr/>
+      </p:nvGrpSpPr>
+      <p:grpSpPr>
+        <a:xfrm>
+          <a:off x="0" y="0"/>
+          <a:ext cx="0" cy="0"/>
+          <a:chOff x="0" y="0"/>
+          <a:chExt cx="0" cy="0"/>
+        </a:xfrm>
+      </p:grpSpPr>
+      <p:sp>
+        <p:nvSpPr>
+          <p:cNvPr id="2" name="Slide Image Placeholder 1"/>
+          <p:cNvSpPr>
+            <a:spLocks noGrp="1" noRot="1" noChangeAspect="1"/>
+          </p:cNvSpPr>
+          <p:nvPr>
+            <p:ph type="sldImg"/>
+          </p:nvPr>
+        </p:nvSpPr>
+        <p:spPr/>
+      </p:sp>
+      <p:sp>
+        <p:nvSpPr>
+          <p:cNvPr id="3" name="Notes Placeholder 2"/>
+          <p:cNvSpPr>
+            <a:spLocks noGrp="1"/>
+          </p:cNvSpPr>
+          <p:nvPr>
+            <p:ph type="body" idx="1"/>
+          </p:nvPr>
+        </p:nvSpPr>
+        <p:spPr/>
+        <p:txBody>
+          <a:bodyPr/>
+          <a:lstStyle/>
+          <a:p>
+            <a:pPr algn="r" rtl="1"/>
+            <a:r>
+              <a:rPr lang="en-US" dirty="0" smtClean="0"/>
+              <a:t>Look</a:t>
+            </a:r>
+            <a:r>
+              <a:rPr lang="en-US" baseline="0" dirty="0" smtClean="0"/>
+              <a:t> back</a:t>
+            </a:r>
+            <a:r>
+              <a:rPr lang="fa-IR" baseline="0" dirty="0" smtClean="0"/>
+              <a:t>: </a:t>
+            </a:r>
+          </a:p>
+          <a:p>
+            <a:pPr algn="r" rtl="1"/>
+            <a:r>
+              <a:rPr lang="en-US" baseline="0" dirty="0" err="1" smtClean="0"/>
+              <a:t>Andicator</a:t>
+            </a:r>
+            <a:r>
+              <a:rPr lang="fa-IR" baseline="0" dirty="0" smtClean="0"/>
+              <a:t>: فرمول‌های ریاضی هستند که یکسری اعداد جدیدی را روی </a:t>
+            </a:r>
+            <a:r>
+              <a:rPr lang="en-US" baseline="0" dirty="0" smtClean="0"/>
+              <a:t>price</a:t>
+            </a:r>
+            <a:r>
+              <a:rPr lang="fa-IR" baseline="0" dirty="0" smtClean="0"/>
+              <a:t> به ما میدهند و میتوان نمودارهای جدیدی به ما بدهند. مثلا </a:t>
+            </a:r>
+            <a:r>
+              <a:rPr lang="en-US" baseline="0" dirty="0" smtClean="0"/>
+              <a:t>pivot</a:t>
+            </a:r>
+            <a:r>
+              <a:rPr lang="fa-IR" baseline="0" dirty="0" smtClean="0"/>
+              <a:t> </a:t>
+            </a:r>
+            <a:r>
+              <a:rPr lang="en-US" baseline="0" dirty="0" err="1" smtClean="0"/>
+              <a:t>andicator</a:t>
+            </a:r>
+            <a:r>
+              <a:rPr lang="fa-IR" baseline="0" dirty="0" smtClean="0"/>
+              <a:t> است.</a:t>
+            </a:r>
+          </a:p>
+          <a:p>
+            <a:pPr algn="r" rtl="1"/>
+            <a:r>
+              <a:rPr lang="fa-IR" baseline="0" dirty="0" smtClean="0"/>
+              <a:t> </a:t>
+            </a:r>
+            <a:endParaRPr lang="en-US" dirty="0"/>
+          </a:p>
+        </p:txBody>
+      </p:sp>
+      <p:sp>
+        <p:nvSpPr>
+          <p:cNvPr id="4" name="Slide Number Placeholder 3"/>
+          <p:cNvSpPr>
+            <a:spLocks noGrp="1"/>
+          </p:cNvSpPr>
+          <p:nvPr>
+            <p:ph type="sldNum" sz="quarter" idx="10"/>
+          </p:nvPr>
+        </p:nvSpPr>
+        <p:spPr/>
+        <p:txBody>
+          <a:bodyPr/>
+          <a:lstStyle/>
+          <a:p>
+            <a:fld id="{A6297769-1C72-4A44-9625-ED38B62D33BE}" type="slidenum">
+              <a:rPr lang="en-US" smtClean="0"/>
+              <a:t>23</a:t>
+            </a:fld>
+            <a:endParaRPr lang="en-US"/>
+          </a:p>
+        </p:txBody>
+      </p:sp>
+    </p:spTree>
+    <p:extLst>
+      <p:ext uri="{BB962C8B-B14F-4D97-AF65-F5344CB8AC3E}">
+        <p14:creationId xmlns:p14="http://schemas.microsoft.com/office/powerpoint/2010/main" val="1449415379"/>
+      </p:ext>
+    </p:extLst>
+  </p:cSld>
+  <p:clrMapOvr>
+    <a:masterClrMapping/>
+  </p:clrMapOvr>
+</p:notes>
+</file>
+
 <file path=ppt/notesSlides/notesSlide2.xml><?xml version="1.0" encoding="utf-8"?>
 <p:notes xmlns:a="http://schemas.openxmlformats.org/drawingml/2006/main" xmlns:r="http://schemas.openxmlformats.org/officeDocument/2006/relationships" xmlns:p="http://schemas.openxmlformats.org/presentationml/2006/main">
   <p:cSld>
@@ -1646,6 +1993,1476 @@
     <p:extLst>
       <p:ext uri="{BB962C8B-B14F-4D97-AF65-F5344CB8AC3E}">
         <p14:creationId xmlns:p14="http://schemas.microsoft.com/office/powerpoint/2010/main" val="1502303440"/>
+      </p:ext>
+    </p:extLst>
+  </p:cSld>
+  <p:clrMapOvr>
+    <a:masterClrMapping/>
+  </p:clrMapOvr>
+</p:notes>
+</file>
+
+<file path=ppt/notesSlides/notesSlide20.xml><?xml version="1.0" encoding="utf-8"?>
+<p:notes xmlns:a="http://schemas.openxmlformats.org/drawingml/2006/main" xmlns:r="http://schemas.openxmlformats.org/officeDocument/2006/relationships" xmlns:p="http://schemas.openxmlformats.org/presentationml/2006/main">
+  <p:cSld>
+    <p:spTree>
+      <p:nvGrpSpPr>
+        <p:cNvPr id="1" name=""/>
+        <p:cNvGrpSpPr/>
+        <p:nvPr/>
+      </p:nvGrpSpPr>
+      <p:grpSpPr>
+        <a:xfrm>
+          <a:off x="0" y="0"/>
+          <a:ext cx="0" cy="0"/>
+          <a:chOff x="0" y="0"/>
+          <a:chExt cx="0" cy="0"/>
+        </a:xfrm>
+      </p:grpSpPr>
+      <p:sp>
+        <p:nvSpPr>
+          <p:cNvPr id="2" name="Slide Image Placeholder 1"/>
+          <p:cNvSpPr>
+            <a:spLocks noGrp="1" noRot="1" noChangeAspect="1"/>
+          </p:cNvSpPr>
+          <p:nvPr>
+            <p:ph type="sldImg"/>
+          </p:nvPr>
+        </p:nvSpPr>
+        <p:spPr/>
+      </p:sp>
+      <p:sp>
+        <p:nvSpPr>
+          <p:cNvPr id="3" name="Notes Placeholder 2"/>
+          <p:cNvSpPr>
+            <a:spLocks noGrp="1"/>
+          </p:cNvSpPr>
+          <p:nvPr>
+            <p:ph type="body" idx="1"/>
+          </p:nvPr>
+        </p:nvSpPr>
+        <p:spPr/>
+        <p:txBody>
+          <a:bodyPr/>
+          <a:lstStyle/>
+          <a:p>
+            <a:pPr algn="r" rtl="1"/>
+            <a:r>
+              <a:rPr lang="fa-IR" baseline="0" dirty="0" smtClean="0"/>
+              <a:t>اگه </a:t>
+            </a:r>
+            <a:r>
+              <a:rPr lang="en-US" baseline="0" dirty="0" smtClean="0"/>
+              <a:t>short-term</a:t>
+            </a:r>
+            <a:r>
+              <a:rPr lang="fa-IR" baseline="0" dirty="0" smtClean="0"/>
+              <a:t> </a:t>
+            </a:r>
+            <a:r>
+              <a:rPr lang="en-US" baseline="0" dirty="0" smtClean="0"/>
+              <a:t>long-term</a:t>
+            </a:r>
+            <a:r>
+              <a:rPr lang="fa-IR" baseline="0" dirty="0" smtClean="0"/>
+              <a:t> رو رو به بالا بشکنه احتمالا رشد صعودی داریم و هر وقت رو به پایین قطع بکنه، نزول خواهیم داشت.</a:t>
+            </a:r>
+          </a:p>
+          <a:p>
+            <a:pPr algn="r" rtl="1"/>
+            <a:r>
+              <a:rPr lang="en-US" baseline="0" dirty="0" smtClean="0"/>
+              <a:t>Look back</a:t>
+            </a:r>
+            <a:r>
+              <a:rPr lang="fa-IR" baseline="0" dirty="0" smtClean="0"/>
+              <a:t>: یعنی به چند کندل قبل اهمیت بده. </a:t>
+            </a:r>
+          </a:p>
+          <a:p>
+            <a:pPr algn="r" rtl="1"/>
+            <a:endParaRPr lang="fa-IR" baseline="0" dirty="0" smtClean="0"/>
+          </a:p>
+        </p:txBody>
+      </p:sp>
+      <p:sp>
+        <p:nvSpPr>
+          <p:cNvPr id="4" name="Slide Number Placeholder 3"/>
+          <p:cNvSpPr>
+            <a:spLocks noGrp="1"/>
+          </p:cNvSpPr>
+          <p:nvPr>
+            <p:ph type="sldNum" sz="quarter" idx="10"/>
+          </p:nvPr>
+        </p:nvSpPr>
+        <p:spPr/>
+        <p:txBody>
+          <a:bodyPr/>
+          <a:lstStyle/>
+          <a:p>
+            <a:fld id="{A6297769-1C72-4A44-9625-ED38B62D33BE}" type="slidenum">
+              <a:rPr lang="en-US" smtClean="0"/>
+              <a:t>25</a:t>
+            </a:fld>
+            <a:endParaRPr lang="en-US"/>
+          </a:p>
+        </p:txBody>
+      </p:sp>
+    </p:spTree>
+    <p:extLst>
+      <p:ext uri="{BB962C8B-B14F-4D97-AF65-F5344CB8AC3E}">
+        <p14:creationId xmlns:p14="http://schemas.microsoft.com/office/powerpoint/2010/main" val="3265385825"/>
+      </p:ext>
+    </p:extLst>
+  </p:cSld>
+  <p:clrMapOvr>
+    <a:masterClrMapping/>
+  </p:clrMapOvr>
+</p:notes>
+</file>
+
+<file path=ppt/notesSlides/notesSlide21.xml><?xml version="1.0" encoding="utf-8"?>
+<p:notes xmlns:a="http://schemas.openxmlformats.org/drawingml/2006/main" xmlns:r="http://schemas.openxmlformats.org/officeDocument/2006/relationships" xmlns:p="http://schemas.openxmlformats.org/presentationml/2006/main">
+  <p:cSld>
+    <p:spTree>
+      <p:nvGrpSpPr>
+        <p:cNvPr id="1" name=""/>
+        <p:cNvGrpSpPr/>
+        <p:nvPr/>
+      </p:nvGrpSpPr>
+      <p:grpSpPr>
+        <a:xfrm>
+          <a:off x="0" y="0"/>
+          <a:ext cx="0" cy="0"/>
+          <a:chOff x="0" y="0"/>
+          <a:chExt cx="0" cy="0"/>
+        </a:xfrm>
+      </p:grpSpPr>
+      <p:sp>
+        <p:nvSpPr>
+          <p:cNvPr id="2" name="Slide Image Placeholder 1"/>
+          <p:cNvSpPr>
+            <a:spLocks noGrp="1" noRot="1" noChangeAspect="1"/>
+          </p:cNvSpPr>
+          <p:nvPr>
+            <p:ph type="sldImg"/>
+          </p:nvPr>
+        </p:nvSpPr>
+        <p:spPr/>
+      </p:sp>
+      <p:sp>
+        <p:nvSpPr>
+          <p:cNvPr id="3" name="Notes Placeholder 2"/>
+          <p:cNvSpPr>
+            <a:spLocks noGrp="1"/>
+          </p:cNvSpPr>
+          <p:nvPr>
+            <p:ph type="body" idx="1"/>
+          </p:nvPr>
+        </p:nvSpPr>
+        <p:spPr/>
+        <p:txBody>
+          <a:bodyPr/>
+          <a:lstStyle/>
+          <a:p>
+            <a:pPr algn="r" rtl="1"/>
+            <a:r>
+              <a:rPr lang="fa-IR" dirty="0" smtClean="0"/>
+              <a:t>حجم معاملات معیاری است از میزان معامله یک دارایی مالی معین در یک دوره زمانی. تعداد افرادی که</a:t>
+            </a:r>
+            <a:r>
+              <a:rPr lang="fa-IR" baseline="0" dirty="0" smtClean="0"/>
+              <a:t> معامله هم میکنن هم مهمه. </a:t>
+            </a:r>
+          </a:p>
+          <a:p>
+            <a:pPr algn="r" rtl="1"/>
+            <a:r>
+              <a:rPr lang="fa-IR" baseline="0" dirty="0" smtClean="0"/>
+              <a:t>نقدشوندگی مهمه. به طور مثال مردم در </a:t>
+            </a:r>
+            <a:r>
+              <a:rPr lang="en-US" baseline="0" dirty="0" err="1" smtClean="0"/>
+              <a:t>binance</a:t>
+            </a:r>
+            <a:r>
+              <a:rPr lang="fa-IR" baseline="0" dirty="0" smtClean="0"/>
+              <a:t> معامله میکنن چون نقدشوندگی بیشتری دارد.</a:t>
+            </a:r>
+          </a:p>
+          <a:p>
+            <a:pPr algn="r" rtl="1"/>
+            <a:r>
+              <a:rPr lang="fa-IR" baseline="0" dirty="0" smtClean="0"/>
+              <a:t>(</a:t>
+            </a:r>
+            <a:r>
+              <a:rPr lang="en-US" baseline="0" dirty="0" smtClean="0"/>
+              <a:t>Volume</a:t>
+            </a:r>
+            <a:r>
+              <a:rPr lang="fa-IR" baseline="0" dirty="0" smtClean="0"/>
+              <a:t> * قیمت سهم) را بهش کف میگن. </a:t>
+            </a:r>
+          </a:p>
+          <a:p>
+            <a:pPr marL="0" marR="0" indent="0" algn="r" defTabSz="914400" rtl="1" eaLnBrk="1" fontAlgn="auto" latinLnBrk="0" hangingPunct="1">
+              <a:lnSpc>
+                <a:spcPct val="100000"/>
+              </a:lnSpc>
+              <a:spcBef>
+                <a:spcPts val="0"/>
+              </a:spcBef>
+              <a:spcAft>
+                <a:spcPts val="0"/>
+              </a:spcAft>
+              <a:buClrTx/>
+              <a:buSzTx/>
+              <a:buFontTx/>
+              <a:buNone/>
+              <a:tabLst/>
+              <a:defRPr/>
+            </a:pPr>
+            <a:endParaRPr lang="fa-IR" baseline="0" dirty="0" smtClean="0"/>
+          </a:p>
+          <a:p>
+            <a:pPr algn="r" rtl="1"/>
+            <a:endParaRPr lang="fa-IR" baseline="0" dirty="0" smtClean="0"/>
+          </a:p>
+        </p:txBody>
+      </p:sp>
+      <p:sp>
+        <p:nvSpPr>
+          <p:cNvPr id="4" name="Slide Number Placeholder 3"/>
+          <p:cNvSpPr>
+            <a:spLocks noGrp="1"/>
+          </p:cNvSpPr>
+          <p:nvPr>
+            <p:ph type="sldNum" sz="quarter" idx="10"/>
+          </p:nvPr>
+        </p:nvSpPr>
+        <p:spPr/>
+        <p:txBody>
+          <a:bodyPr/>
+          <a:lstStyle/>
+          <a:p>
+            <a:fld id="{A6297769-1C72-4A44-9625-ED38B62D33BE}" type="slidenum">
+              <a:rPr lang="en-US" smtClean="0"/>
+              <a:t>27</a:t>
+            </a:fld>
+            <a:endParaRPr lang="en-US"/>
+          </a:p>
+        </p:txBody>
+      </p:sp>
+    </p:spTree>
+    <p:extLst>
+      <p:ext uri="{BB962C8B-B14F-4D97-AF65-F5344CB8AC3E}">
+        <p14:creationId xmlns:p14="http://schemas.microsoft.com/office/powerpoint/2010/main" val="2778912507"/>
+      </p:ext>
+    </p:extLst>
+  </p:cSld>
+  <p:clrMapOvr>
+    <a:masterClrMapping/>
+  </p:clrMapOvr>
+</p:notes>
+</file>
+
+<file path=ppt/notesSlides/notesSlide22.xml><?xml version="1.0" encoding="utf-8"?>
+<p:notes xmlns:a="http://schemas.openxmlformats.org/drawingml/2006/main" xmlns:r="http://schemas.openxmlformats.org/officeDocument/2006/relationships" xmlns:p="http://schemas.openxmlformats.org/presentationml/2006/main">
+  <p:cSld>
+    <p:spTree>
+      <p:nvGrpSpPr>
+        <p:cNvPr id="1" name=""/>
+        <p:cNvGrpSpPr/>
+        <p:nvPr/>
+      </p:nvGrpSpPr>
+      <p:grpSpPr>
+        <a:xfrm>
+          <a:off x="0" y="0"/>
+          <a:ext cx="0" cy="0"/>
+          <a:chOff x="0" y="0"/>
+          <a:chExt cx="0" cy="0"/>
+        </a:xfrm>
+      </p:grpSpPr>
+      <p:sp>
+        <p:nvSpPr>
+          <p:cNvPr id="2" name="Slide Image Placeholder 1"/>
+          <p:cNvSpPr>
+            <a:spLocks noGrp="1" noRot="1" noChangeAspect="1"/>
+          </p:cNvSpPr>
+          <p:nvPr>
+            <p:ph type="sldImg"/>
+          </p:nvPr>
+        </p:nvSpPr>
+        <p:spPr/>
+      </p:sp>
+      <p:sp>
+        <p:nvSpPr>
+          <p:cNvPr id="3" name="Notes Placeholder 2"/>
+          <p:cNvSpPr>
+            <a:spLocks noGrp="1"/>
+          </p:cNvSpPr>
+          <p:nvPr>
+            <p:ph type="body" idx="1"/>
+          </p:nvPr>
+        </p:nvSpPr>
+        <p:spPr/>
+        <p:txBody>
+          <a:bodyPr/>
+          <a:lstStyle/>
+          <a:p>
+            <a:pPr algn="r" rtl="1"/>
+            <a:r>
+              <a:rPr lang="en-US" baseline="0" dirty="0" smtClean="0"/>
+              <a:t>Volume</a:t>
+            </a:r>
+            <a:r>
+              <a:rPr lang="fa-IR" baseline="0" dirty="0" smtClean="0"/>
+              <a:t> بالاتر توی </a:t>
+            </a:r>
+            <a:r>
+              <a:rPr lang="en-US" baseline="0" dirty="0" smtClean="0"/>
+              <a:t>up trend</a:t>
+            </a:r>
+            <a:r>
+              <a:rPr lang="fa-IR" baseline="0" dirty="0" smtClean="0"/>
+              <a:t>، اونو تقویت میکنه و </a:t>
+            </a:r>
+            <a:r>
+              <a:rPr lang="en-US" baseline="0" dirty="0" smtClean="0"/>
+              <a:t>volume</a:t>
+            </a:r>
+            <a:r>
+              <a:rPr lang="fa-IR" baseline="0" dirty="0" smtClean="0"/>
+              <a:t> بالاتر توی </a:t>
+            </a:r>
+            <a:r>
+              <a:rPr lang="en-US" baseline="0" dirty="0" smtClean="0"/>
+              <a:t>downtrend</a:t>
+            </a:r>
+            <a:r>
+              <a:rPr lang="fa-IR" baseline="0" dirty="0" smtClean="0"/>
+              <a:t> اونو تقویت میکنه.</a:t>
+            </a:r>
+          </a:p>
+          <a:p>
+            <a:pPr marL="0" marR="0" indent="0" algn="r" defTabSz="914400" rtl="1" eaLnBrk="1" fontAlgn="auto" latinLnBrk="0" hangingPunct="1">
+              <a:lnSpc>
+                <a:spcPct val="100000"/>
+              </a:lnSpc>
+              <a:spcBef>
+                <a:spcPts val="0"/>
+              </a:spcBef>
+              <a:spcAft>
+                <a:spcPts val="0"/>
+              </a:spcAft>
+              <a:buClrTx/>
+              <a:buSzTx/>
+              <a:buFontTx/>
+              <a:buNone/>
+              <a:tabLst/>
+              <a:defRPr/>
+            </a:pPr>
+            <a:r>
+              <a:rPr lang="en-US" baseline="0" dirty="0" smtClean="0"/>
+              <a:t>Volume</a:t>
+            </a:r>
+            <a:r>
+              <a:rPr lang="fa-IR" baseline="0" dirty="0" smtClean="0"/>
+              <a:t> پایین‌تر توی </a:t>
+            </a:r>
+            <a:r>
+              <a:rPr lang="en-US" baseline="0" dirty="0" smtClean="0"/>
+              <a:t>up trend</a:t>
+            </a:r>
+            <a:r>
+              <a:rPr lang="fa-IR" baseline="0" dirty="0" smtClean="0"/>
+              <a:t>، یعنی احتمالا قیمت داره برمیگرده و </a:t>
+            </a:r>
+            <a:r>
+              <a:rPr lang="en-US" baseline="0" dirty="0" smtClean="0"/>
+              <a:t>volume</a:t>
+            </a:r>
+            <a:r>
+              <a:rPr lang="fa-IR" baseline="0" dirty="0" smtClean="0"/>
+              <a:t> پایین‌تر توی </a:t>
+            </a:r>
+            <a:r>
+              <a:rPr lang="en-US" baseline="0" dirty="0" smtClean="0"/>
+              <a:t>downtrend</a:t>
+            </a:r>
+            <a:r>
+              <a:rPr lang="fa-IR" baseline="0" dirty="0" smtClean="0"/>
+              <a:t> یعنی احتمالا قیمت میخواد افزایش پیدا کنه.</a:t>
+            </a:r>
+            <a:endParaRPr lang="fa-IR" dirty="0" smtClean="0"/>
+          </a:p>
+          <a:p>
+            <a:pPr algn="r" rtl="1"/>
+            <a:endParaRPr lang="fa-IR" dirty="0" smtClean="0"/>
+          </a:p>
+          <a:p>
+            <a:pPr algn="r" rtl="1"/>
+            <a:r>
+              <a:rPr lang="en-US" dirty="0" smtClean="0"/>
+              <a:t>Breakout</a:t>
+            </a:r>
+            <a:r>
+              <a:rPr lang="fa-IR" dirty="0" smtClean="0"/>
+              <a:t>ها:</a:t>
+            </a:r>
+            <a:r>
+              <a:rPr lang="fa-IR" baseline="0" dirty="0" smtClean="0"/>
+              <a:t> جایی که خطوط مقاومت و حمایت را میکشیدیم میگفتیم شکسته. اگه کندل خط را بکشند به آن </a:t>
+            </a:r>
+            <a:r>
+              <a:rPr lang="en-US" baseline="0" dirty="0" smtClean="0"/>
+              <a:t>breakout</a:t>
+            </a:r>
+            <a:r>
+              <a:rPr lang="fa-IR" baseline="0" dirty="0" smtClean="0"/>
+              <a:t> گویند. جایی که </a:t>
+            </a:r>
+            <a:r>
+              <a:rPr lang="en-US" baseline="0" dirty="0" smtClean="0"/>
+              <a:t>breakout</a:t>
+            </a:r>
+            <a:r>
+              <a:rPr lang="fa-IR" baseline="0" dirty="0" smtClean="0"/>
+              <a:t> ببینیم باید حجم بالایی خورده باشه. اگه دو یا سه کندل که یک خط را بشکند، حجم بالایی داشته باشند یعنی شکست واقعی بوده و اگر حجم کم بوده یعنی واقعی نبوده.</a:t>
+            </a:r>
+            <a:endParaRPr lang="fa-IR" dirty="0" smtClean="0"/>
+          </a:p>
+        </p:txBody>
+      </p:sp>
+      <p:sp>
+        <p:nvSpPr>
+          <p:cNvPr id="4" name="Slide Number Placeholder 3"/>
+          <p:cNvSpPr>
+            <a:spLocks noGrp="1"/>
+          </p:cNvSpPr>
+          <p:nvPr>
+            <p:ph type="sldNum" sz="quarter" idx="10"/>
+          </p:nvPr>
+        </p:nvSpPr>
+        <p:spPr/>
+        <p:txBody>
+          <a:bodyPr/>
+          <a:lstStyle/>
+          <a:p>
+            <a:fld id="{A6297769-1C72-4A44-9625-ED38B62D33BE}" type="slidenum">
+              <a:rPr lang="en-US" smtClean="0"/>
+              <a:t>28</a:t>
+            </a:fld>
+            <a:endParaRPr lang="en-US"/>
+          </a:p>
+        </p:txBody>
+      </p:sp>
+    </p:spTree>
+    <p:extLst>
+      <p:ext uri="{BB962C8B-B14F-4D97-AF65-F5344CB8AC3E}">
+        <p14:creationId xmlns:p14="http://schemas.microsoft.com/office/powerpoint/2010/main" val="2540393328"/>
+      </p:ext>
+    </p:extLst>
+  </p:cSld>
+  <p:clrMapOvr>
+    <a:masterClrMapping/>
+  </p:clrMapOvr>
+</p:notes>
+</file>
+
+<file path=ppt/notesSlides/notesSlide23.xml><?xml version="1.0" encoding="utf-8"?>
+<p:notes xmlns:a="http://schemas.openxmlformats.org/drawingml/2006/main" xmlns:r="http://schemas.openxmlformats.org/officeDocument/2006/relationships" xmlns:p="http://schemas.openxmlformats.org/presentationml/2006/main">
+  <p:cSld>
+    <p:spTree>
+      <p:nvGrpSpPr>
+        <p:cNvPr id="1" name=""/>
+        <p:cNvGrpSpPr/>
+        <p:nvPr/>
+      </p:nvGrpSpPr>
+      <p:grpSpPr>
+        <a:xfrm>
+          <a:off x="0" y="0"/>
+          <a:ext cx="0" cy="0"/>
+          <a:chOff x="0" y="0"/>
+          <a:chExt cx="0" cy="0"/>
+        </a:xfrm>
+      </p:grpSpPr>
+      <p:sp>
+        <p:nvSpPr>
+          <p:cNvPr id="2" name="Slide Image Placeholder 1"/>
+          <p:cNvSpPr>
+            <a:spLocks noGrp="1" noRot="1" noChangeAspect="1"/>
+          </p:cNvSpPr>
+          <p:nvPr>
+            <p:ph type="sldImg"/>
+          </p:nvPr>
+        </p:nvSpPr>
+        <p:spPr/>
+      </p:sp>
+      <p:sp>
+        <p:nvSpPr>
+          <p:cNvPr id="3" name="Notes Placeholder 2"/>
+          <p:cNvSpPr>
+            <a:spLocks noGrp="1"/>
+          </p:cNvSpPr>
+          <p:nvPr>
+            <p:ph type="body" idx="1"/>
+          </p:nvPr>
+        </p:nvSpPr>
+        <p:spPr/>
+        <p:txBody>
+          <a:bodyPr/>
+          <a:lstStyle/>
+          <a:p>
+            <a:pPr algn="r" rtl="1"/>
+            <a:r>
+              <a:rPr lang="fa-IR" dirty="0" smtClean="0"/>
+              <a:t>دوتا</a:t>
+            </a:r>
+            <a:r>
+              <a:rPr lang="fa-IR" baseline="0" dirty="0" smtClean="0"/>
+              <a:t> </a:t>
+            </a:r>
+            <a:r>
+              <a:rPr lang="en-US" baseline="0" dirty="0" smtClean="0"/>
+              <a:t>EMA</a:t>
+            </a:r>
+            <a:r>
+              <a:rPr lang="fa-IR" baseline="0" dirty="0" smtClean="0"/>
+              <a:t> میگیریم یکی رو پریود 26 یکی رو 12. </a:t>
+            </a:r>
+            <a:r>
+              <a:rPr lang="en-US" baseline="0" dirty="0" smtClean="0"/>
+              <a:t>MACD</a:t>
+            </a:r>
+            <a:r>
+              <a:rPr lang="fa-IR" baseline="0" dirty="0" smtClean="0"/>
+              <a:t> دوتا خط داره. در واقع </a:t>
+            </a:r>
+            <a:r>
+              <a:rPr lang="en-US" baseline="0" dirty="0" smtClean="0"/>
+              <a:t>12 </a:t>
+            </a:r>
+            <a:r>
+              <a:rPr lang="fa-IR" baseline="0" dirty="0" smtClean="0"/>
+              <a:t> و 26 </a:t>
+            </a:r>
+            <a:r>
+              <a:rPr lang="en-US" baseline="0" dirty="0" smtClean="0"/>
+              <a:t>Loop back</a:t>
+            </a:r>
+            <a:r>
+              <a:rPr lang="fa-IR" baseline="0" dirty="0" smtClean="0"/>
+              <a:t> عه که از تفاضلشون </a:t>
+            </a:r>
+            <a:r>
+              <a:rPr lang="en-US" baseline="0" dirty="0" smtClean="0"/>
+              <a:t>MACD</a:t>
+            </a:r>
+            <a:r>
+              <a:rPr lang="fa-IR" baseline="0" dirty="0" smtClean="0"/>
+              <a:t> پیدا میشه که چندتاشون باهم یک خط درست میکنن که از اون یک </a:t>
+            </a:r>
+            <a:r>
+              <a:rPr lang="en-US" baseline="0" dirty="0" smtClean="0"/>
+              <a:t>EMA9</a:t>
+            </a:r>
+            <a:r>
+              <a:rPr lang="fa-IR" baseline="0" dirty="0" smtClean="0"/>
+              <a:t> میگیریم که اون </a:t>
+            </a:r>
+            <a:r>
+              <a:rPr lang="en-US" baseline="0" dirty="0" smtClean="0"/>
+              <a:t>signal line</a:t>
+            </a:r>
+            <a:r>
+              <a:rPr lang="fa-IR" baseline="0" dirty="0" smtClean="0"/>
+              <a:t> میشه.</a:t>
+            </a:r>
+          </a:p>
+          <a:p>
+            <a:pPr algn="r" rtl="1"/>
+            <a:r>
+              <a:rPr lang="fa-IR" baseline="0" dirty="0" smtClean="0"/>
+              <a:t>اگه </a:t>
+            </a:r>
+            <a:r>
+              <a:rPr lang="en-US" baseline="0" dirty="0" smtClean="0"/>
+              <a:t>MACD</a:t>
+            </a:r>
+            <a:r>
+              <a:rPr lang="fa-IR" baseline="0" dirty="0" smtClean="0"/>
+              <a:t> </a:t>
+            </a:r>
+            <a:r>
+              <a:rPr lang="en-US" baseline="0" dirty="0" smtClean="0"/>
+              <a:t>signal line</a:t>
+            </a:r>
+            <a:r>
+              <a:rPr lang="fa-IR" baseline="0" dirty="0" smtClean="0"/>
+              <a:t> رو رو به بالا قطع بکنه ازش وایب خرید و اگر رو به پایین قطع بکنه ازش وایب فروش میگیریم. </a:t>
+            </a:r>
+            <a:endParaRPr lang="en-US" dirty="0"/>
+          </a:p>
+        </p:txBody>
+      </p:sp>
+      <p:sp>
+        <p:nvSpPr>
+          <p:cNvPr id="4" name="Slide Number Placeholder 3"/>
+          <p:cNvSpPr>
+            <a:spLocks noGrp="1"/>
+          </p:cNvSpPr>
+          <p:nvPr>
+            <p:ph type="sldNum" sz="quarter" idx="10"/>
+          </p:nvPr>
+        </p:nvSpPr>
+        <p:spPr/>
+        <p:txBody>
+          <a:bodyPr/>
+          <a:lstStyle/>
+          <a:p>
+            <a:fld id="{A6297769-1C72-4A44-9625-ED38B62D33BE}" type="slidenum">
+              <a:rPr lang="en-US" smtClean="0"/>
+              <a:t>30</a:t>
+            </a:fld>
+            <a:endParaRPr lang="en-US"/>
+          </a:p>
+        </p:txBody>
+      </p:sp>
+    </p:spTree>
+    <p:extLst>
+      <p:ext uri="{BB962C8B-B14F-4D97-AF65-F5344CB8AC3E}">
+        <p14:creationId xmlns:p14="http://schemas.microsoft.com/office/powerpoint/2010/main" val="3988321998"/>
+      </p:ext>
+    </p:extLst>
+  </p:cSld>
+  <p:clrMapOvr>
+    <a:masterClrMapping/>
+  </p:clrMapOvr>
+</p:notes>
+</file>
+
+<file path=ppt/notesSlides/notesSlide24.xml><?xml version="1.0" encoding="utf-8"?>
+<p:notes xmlns:a="http://schemas.openxmlformats.org/drawingml/2006/main" xmlns:r="http://schemas.openxmlformats.org/officeDocument/2006/relationships" xmlns:p="http://schemas.openxmlformats.org/presentationml/2006/main">
+  <p:cSld>
+    <p:spTree>
+      <p:nvGrpSpPr>
+        <p:cNvPr id="1" name=""/>
+        <p:cNvGrpSpPr/>
+        <p:nvPr/>
+      </p:nvGrpSpPr>
+      <p:grpSpPr>
+        <a:xfrm>
+          <a:off x="0" y="0"/>
+          <a:ext cx="0" cy="0"/>
+          <a:chOff x="0" y="0"/>
+          <a:chExt cx="0" cy="0"/>
+        </a:xfrm>
+      </p:grpSpPr>
+      <p:sp>
+        <p:nvSpPr>
+          <p:cNvPr id="2" name="Slide Image Placeholder 1"/>
+          <p:cNvSpPr>
+            <a:spLocks noGrp="1" noRot="1" noChangeAspect="1"/>
+          </p:cNvSpPr>
+          <p:nvPr>
+            <p:ph type="sldImg"/>
+          </p:nvPr>
+        </p:nvSpPr>
+        <p:spPr/>
+      </p:sp>
+      <p:sp>
+        <p:nvSpPr>
+          <p:cNvPr id="3" name="Notes Placeholder 2"/>
+          <p:cNvSpPr>
+            <a:spLocks noGrp="1"/>
+          </p:cNvSpPr>
+          <p:nvPr>
+            <p:ph type="body" idx="1"/>
+          </p:nvPr>
+        </p:nvSpPr>
+        <p:spPr/>
+        <p:txBody>
+          <a:bodyPr/>
+          <a:lstStyle/>
+          <a:p>
+            <a:pPr algn="r" rtl="1"/>
+            <a:endParaRPr lang="en-US" dirty="0"/>
+          </a:p>
+        </p:txBody>
+      </p:sp>
+      <p:sp>
+        <p:nvSpPr>
+          <p:cNvPr id="4" name="Slide Number Placeholder 3"/>
+          <p:cNvSpPr>
+            <a:spLocks noGrp="1"/>
+          </p:cNvSpPr>
+          <p:nvPr>
+            <p:ph type="sldNum" sz="quarter" idx="10"/>
+          </p:nvPr>
+        </p:nvSpPr>
+        <p:spPr/>
+        <p:txBody>
+          <a:bodyPr/>
+          <a:lstStyle/>
+          <a:p>
+            <a:fld id="{A6297769-1C72-4A44-9625-ED38B62D33BE}" type="slidenum">
+              <a:rPr lang="en-US" smtClean="0"/>
+              <a:t>31</a:t>
+            </a:fld>
+            <a:endParaRPr lang="en-US"/>
+          </a:p>
+        </p:txBody>
+      </p:sp>
+    </p:spTree>
+    <p:extLst>
+      <p:ext uri="{BB962C8B-B14F-4D97-AF65-F5344CB8AC3E}">
+        <p14:creationId xmlns:p14="http://schemas.microsoft.com/office/powerpoint/2010/main" val="3681028129"/>
+      </p:ext>
+    </p:extLst>
+  </p:cSld>
+  <p:clrMapOvr>
+    <a:masterClrMapping/>
+  </p:clrMapOvr>
+</p:notes>
+</file>
+
+<file path=ppt/notesSlides/notesSlide25.xml><?xml version="1.0" encoding="utf-8"?>
+<p:notes xmlns:a="http://schemas.openxmlformats.org/drawingml/2006/main" xmlns:r="http://schemas.openxmlformats.org/officeDocument/2006/relationships" xmlns:p="http://schemas.openxmlformats.org/presentationml/2006/main">
+  <p:cSld>
+    <p:spTree>
+      <p:nvGrpSpPr>
+        <p:cNvPr id="1" name=""/>
+        <p:cNvGrpSpPr/>
+        <p:nvPr/>
+      </p:nvGrpSpPr>
+      <p:grpSpPr>
+        <a:xfrm>
+          <a:off x="0" y="0"/>
+          <a:ext cx="0" cy="0"/>
+          <a:chOff x="0" y="0"/>
+          <a:chExt cx="0" cy="0"/>
+        </a:xfrm>
+      </p:grpSpPr>
+      <p:sp>
+        <p:nvSpPr>
+          <p:cNvPr id="2" name="Slide Image Placeholder 1"/>
+          <p:cNvSpPr>
+            <a:spLocks noGrp="1" noRot="1" noChangeAspect="1"/>
+          </p:cNvSpPr>
+          <p:nvPr>
+            <p:ph type="sldImg"/>
+          </p:nvPr>
+        </p:nvSpPr>
+        <p:spPr/>
+      </p:sp>
+      <p:sp>
+        <p:nvSpPr>
+          <p:cNvPr id="3" name="Notes Placeholder 2"/>
+          <p:cNvSpPr>
+            <a:spLocks noGrp="1"/>
+          </p:cNvSpPr>
+          <p:nvPr>
+            <p:ph type="body" idx="1"/>
+          </p:nvPr>
+        </p:nvSpPr>
+        <p:spPr/>
+        <p:txBody>
+          <a:bodyPr/>
+          <a:lstStyle/>
+          <a:p>
+            <a:pPr algn="r" rtl="1"/>
+            <a:r>
+              <a:rPr lang="fa-IR" dirty="0" smtClean="0"/>
+              <a:t>اگر</a:t>
+            </a:r>
+            <a:r>
+              <a:rPr lang="fa-IR" baseline="0" dirty="0" smtClean="0"/>
+              <a:t> </a:t>
+            </a:r>
+            <a:r>
+              <a:rPr lang="en-US" baseline="0" dirty="0" smtClean="0"/>
+              <a:t>MACD</a:t>
+            </a:r>
+            <a:r>
+              <a:rPr lang="fa-IR" baseline="0" dirty="0" smtClean="0"/>
+              <a:t> بالاتر از </a:t>
+            </a:r>
+            <a:r>
+              <a:rPr lang="en-US" baseline="0" dirty="0" smtClean="0"/>
+              <a:t>signal line</a:t>
+            </a:r>
+            <a:r>
+              <a:rPr lang="fa-IR" baseline="0" dirty="0" smtClean="0"/>
+              <a:t> باشه رنگ سبزه و در غیر این صورت قرمزه. مقدار بالا پایین شدن و تفاوت را با روشن یا تیره شدن رنگ سبز یا قرمز نشون میدن.</a:t>
+            </a:r>
+            <a:endParaRPr lang="en-US" dirty="0"/>
+          </a:p>
+        </p:txBody>
+      </p:sp>
+      <p:sp>
+        <p:nvSpPr>
+          <p:cNvPr id="4" name="Slide Number Placeholder 3"/>
+          <p:cNvSpPr>
+            <a:spLocks noGrp="1"/>
+          </p:cNvSpPr>
+          <p:nvPr>
+            <p:ph type="sldNum" sz="quarter" idx="10"/>
+          </p:nvPr>
+        </p:nvSpPr>
+        <p:spPr/>
+        <p:txBody>
+          <a:bodyPr/>
+          <a:lstStyle/>
+          <a:p>
+            <a:fld id="{A6297769-1C72-4A44-9625-ED38B62D33BE}" type="slidenum">
+              <a:rPr lang="en-US" smtClean="0"/>
+              <a:t>32</a:t>
+            </a:fld>
+            <a:endParaRPr lang="en-US"/>
+          </a:p>
+        </p:txBody>
+      </p:sp>
+    </p:spTree>
+    <p:extLst>
+      <p:ext uri="{BB962C8B-B14F-4D97-AF65-F5344CB8AC3E}">
+        <p14:creationId xmlns:p14="http://schemas.microsoft.com/office/powerpoint/2010/main" val="2359440314"/>
+      </p:ext>
+    </p:extLst>
+  </p:cSld>
+  <p:clrMapOvr>
+    <a:masterClrMapping/>
+  </p:clrMapOvr>
+</p:notes>
+</file>
+
+<file path=ppt/notesSlides/notesSlide26.xml><?xml version="1.0" encoding="utf-8"?>
+<p:notes xmlns:a="http://schemas.openxmlformats.org/drawingml/2006/main" xmlns:r="http://schemas.openxmlformats.org/officeDocument/2006/relationships" xmlns:p="http://schemas.openxmlformats.org/presentationml/2006/main">
+  <p:cSld>
+    <p:spTree>
+      <p:nvGrpSpPr>
+        <p:cNvPr id="1" name=""/>
+        <p:cNvGrpSpPr/>
+        <p:nvPr/>
+      </p:nvGrpSpPr>
+      <p:grpSpPr>
+        <a:xfrm>
+          <a:off x="0" y="0"/>
+          <a:ext cx="0" cy="0"/>
+          <a:chOff x="0" y="0"/>
+          <a:chExt cx="0" cy="0"/>
+        </a:xfrm>
+      </p:grpSpPr>
+      <p:sp>
+        <p:nvSpPr>
+          <p:cNvPr id="2" name="Slide Image Placeholder 1"/>
+          <p:cNvSpPr>
+            <a:spLocks noGrp="1" noRot="1" noChangeAspect="1"/>
+          </p:cNvSpPr>
+          <p:nvPr>
+            <p:ph type="sldImg"/>
+          </p:nvPr>
+        </p:nvSpPr>
+        <p:spPr/>
+      </p:sp>
+      <p:sp>
+        <p:nvSpPr>
+          <p:cNvPr id="3" name="Notes Placeholder 2"/>
+          <p:cNvSpPr>
+            <a:spLocks noGrp="1"/>
+          </p:cNvSpPr>
+          <p:nvPr>
+            <p:ph type="body" idx="1"/>
+          </p:nvPr>
+        </p:nvSpPr>
+        <p:spPr/>
+        <p:txBody>
+          <a:bodyPr/>
+          <a:lstStyle/>
+          <a:p>
+            <a:pPr algn="r" rtl="1"/>
+            <a:r>
+              <a:rPr lang="en-US" dirty="0" err="1" smtClean="0"/>
+              <a:t>Andicator</a:t>
+            </a:r>
+            <a:r>
+              <a:rPr lang="fa-IR" dirty="0" smtClean="0"/>
+              <a:t>هایی</a:t>
+            </a:r>
+            <a:r>
+              <a:rPr lang="fa-IR" baseline="0" dirty="0" smtClean="0"/>
+              <a:t> که میزان شتاب صعودی و نزولی رو نشون میدن بهشون </a:t>
+            </a:r>
+            <a:r>
+              <a:rPr lang="en-US" baseline="0" dirty="0" smtClean="0"/>
+              <a:t>momentum</a:t>
+            </a:r>
+            <a:r>
+              <a:rPr lang="fa-IR" baseline="0" dirty="0" smtClean="0"/>
+              <a:t>ی میگویند. در اونها سرعت و بزرگی تغییرات رو نشون میدن.</a:t>
+            </a:r>
+          </a:p>
+          <a:p>
+            <a:pPr algn="r" rtl="1"/>
+            <a:r>
+              <a:rPr lang="en-US" baseline="0" dirty="0" smtClean="0"/>
+              <a:t>Average gain</a:t>
+            </a:r>
+            <a:r>
+              <a:rPr lang="fa-IR" baseline="0" dirty="0" smtClean="0"/>
+              <a:t> و </a:t>
+            </a:r>
+            <a:r>
+              <a:rPr lang="en-US" baseline="0" dirty="0" smtClean="0"/>
+              <a:t>average loss</a:t>
+            </a:r>
+            <a:r>
+              <a:rPr lang="fa-IR" baseline="0" dirty="0" smtClean="0"/>
+              <a:t> در یک تایم مشخص گرفته میشن. </a:t>
+            </a:r>
+          </a:p>
+        </p:txBody>
+      </p:sp>
+      <p:sp>
+        <p:nvSpPr>
+          <p:cNvPr id="4" name="Slide Number Placeholder 3"/>
+          <p:cNvSpPr>
+            <a:spLocks noGrp="1"/>
+          </p:cNvSpPr>
+          <p:nvPr>
+            <p:ph type="sldNum" sz="quarter" idx="10"/>
+          </p:nvPr>
+        </p:nvSpPr>
+        <p:spPr/>
+        <p:txBody>
+          <a:bodyPr/>
+          <a:lstStyle/>
+          <a:p>
+            <a:fld id="{A6297769-1C72-4A44-9625-ED38B62D33BE}" type="slidenum">
+              <a:rPr lang="en-US" smtClean="0"/>
+              <a:t>33</a:t>
+            </a:fld>
+            <a:endParaRPr lang="en-US"/>
+          </a:p>
+        </p:txBody>
+      </p:sp>
+    </p:spTree>
+    <p:extLst>
+      <p:ext uri="{BB962C8B-B14F-4D97-AF65-F5344CB8AC3E}">
+        <p14:creationId xmlns:p14="http://schemas.microsoft.com/office/powerpoint/2010/main" val="3812320694"/>
+      </p:ext>
+    </p:extLst>
+  </p:cSld>
+  <p:clrMapOvr>
+    <a:masterClrMapping/>
+  </p:clrMapOvr>
+</p:notes>
+</file>
+
+<file path=ppt/notesSlides/notesSlide27.xml><?xml version="1.0" encoding="utf-8"?>
+<p:notes xmlns:a="http://schemas.openxmlformats.org/drawingml/2006/main" xmlns:r="http://schemas.openxmlformats.org/officeDocument/2006/relationships" xmlns:p="http://schemas.openxmlformats.org/presentationml/2006/main">
+  <p:cSld>
+    <p:spTree>
+      <p:nvGrpSpPr>
+        <p:cNvPr id="1" name=""/>
+        <p:cNvGrpSpPr/>
+        <p:nvPr/>
+      </p:nvGrpSpPr>
+      <p:grpSpPr>
+        <a:xfrm>
+          <a:off x="0" y="0"/>
+          <a:ext cx="0" cy="0"/>
+          <a:chOff x="0" y="0"/>
+          <a:chExt cx="0" cy="0"/>
+        </a:xfrm>
+      </p:grpSpPr>
+      <p:sp>
+        <p:nvSpPr>
+          <p:cNvPr id="2" name="Slide Image Placeholder 1"/>
+          <p:cNvSpPr>
+            <a:spLocks noGrp="1" noRot="1" noChangeAspect="1"/>
+          </p:cNvSpPr>
+          <p:nvPr>
+            <p:ph type="sldImg"/>
+          </p:nvPr>
+        </p:nvSpPr>
+        <p:spPr/>
+      </p:sp>
+      <p:sp>
+        <p:nvSpPr>
+          <p:cNvPr id="3" name="Notes Placeholder 2"/>
+          <p:cNvSpPr>
+            <a:spLocks noGrp="1"/>
+          </p:cNvSpPr>
+          <p:nvPr>
+            <p:ph type="body" idx="1"/>
+          </p:nvPr>
+        </p:nvSpPr>
+        <p:spPr/>
+        <p:txBody>
+          <a:bodyPr/>
+          <a:lstStyle/>
+          <a:p>
+            <a:pPr algn="r" rtl="1"/>
+            <a:r>
+              <a:rPr lang="fa-IR" baseline="0" dirty="0" smtClean="0"/>
+              <a:t>کار </a:t>
+            </a:r>
+            <a:r>
+              <a:rPr lang="en-US" baseline="0" dirty="0" smtClean="0"/>
+              <a:t>RSI</a:t>
+            </a:r>
+            <a:r>
+              <a:rPr lang="fa-IR" baseline="0" dirty="0" smtClean="0"/>
+              <a:t> این است که یک </a:t>
+            </a:r>
+            <a:r>
+              <a:rPr lang="en-US" baseline="0" dirty="0" smtClean="0"/>
+              <a:t>Look back</a:t>
+            </a:r>
+            <a:r>
+              <a:rPr lang="fa-IR" baseline="0" dirty="0" smtClean="0"/>
+              <a:t> حساب میکنن که در اون میکشن که دوتا </a:t>
+            </a:r>
+            <a:r>
+              <a:rPr lang="en-US" baseline="0" dirty="0" smtClean="0"/>
+              <a:t>threshold</a:t>
+            </a:r>
+            <a:r>
+              <a:rPr lang="fa-IR" baseline="0" dirty="0" smtClean="0"/>
+              <a:t> مشخص میکنن که پیش فرض 30 و 70 عه و </a:t>
+            </a:r>
+            <a:r>
+              <a:rPr lang="en-US" baseline="0" dirty="0" smtClean="0"/>
+              <a:t>RSI</a:t>
+            </a:r>
+            <a:r>
+              <a:rPr lang="fa-IR" baseline="0" dirty="0" smtClean="0"/>
+              <a:t> یک عدد بین 0 و 100 عه. در واقع وقتی </a:t>
+            </a:r>
+            <a:r>
+              <a:rPr lang="en-US" baseline="0" dirty="0" smtClean="0"/>
+              <a:t>RSI</a:t>
+            </a:r>
+            <a:r>
+              <a:rPr lang="fa-IR" baseline="0" dirty="0" smtClean="0"/>
+              <a:t> از </a:t>
+            </a:r>
+            <a:r>
+              <a:rPr lang="en-US" baseline="0" dirty="0" smtClean="0"/>
+              <a:t>70</a:t>
+            </a:r>
+            <a:r>
+              <a:rPr lang="fa-IR" baseline="0" dirty="0" smtClean="0"/>
+              <a:t> بیشتر بشه یعنی رفته تو </a:t>
+            </a:r>
+            <a:r>
+              <a:rPr lang="en-US" baseline="0" dirty="0" smtClean="0"/>
+              <a:t>over bound</a:t>
+            </a:r>
+            <a:r>
+              <a:rPr lang="fa-IR" baseline="0" dirty="0" smtClean="0"/>
+              <a:t> شده یعنی بیش از حد خریدن و احتمالا ریزش داره. واسه 30 هم به همین صورت ولی برعکس. از </a:t>
+            </a:r>
+            <a:r>
+              <a:rPr lang="en-US" baseline="0" dirty="0" err="1" smtClean="0"/>
+              <a:t>andicator</a:t>
+            </a:r>
+            <a:r>
+              <a:rPr lang="fa-IR" baseline="0" dirty="0" smtClean="0"/>
+              <a:t> سیگنال خروج میگیرن نه ورود. </a:t>
+            </a:r>
+          </a:p>
+          <a:p>
+            <a:pPr algn="r" rtl="1"/>
+            <a:r>
+              <a:rPr lang="fa-IR" baseline="0" dirty="0" smtClean="0"/>
+              <a:t>در بین 30 و 70 سیگنالی به ما نمیده ولی بعضیا دو خط 45 و 50 میکشن که به صورت مقاومت عمل میکنن. یه چیزی مثل </a:t>
+            </a:r>
+            <a:r>
+              <a:rPr lang="en-US" baseline="0" dirty="0" smtClean="0"/>
+              <a:t>support and resistance</a:t>
+            </a:r>
+            <a:r>
+              <a:rPr lang="fa-IR" baseline="0" dirty="0" smtClean="0"/>
+              <a:t>. </a:t>
+            </a:r>
+            <a:endParaRPr lang="en-US" dirty="0" smtClean="0"/>
+          </a:p>
+          <a:p>
+            <a:pPr algn="r" rtl="1"/>
+            <a:endParaRPr lang="en-US" dirty="0"/>
+          </a:p>
+        </p:txBody>
+      </p:sp>
+      <p:sp>
+        <p:nvSpPr>
+          <p:cNvPr id="4" name="Slide Number Placeholder 3"/>
+          <p:cNvSpPr>
+            <a:spLocks noGrp="1"/>
+          </p:cNvSpPr>
+          <p:nvPr>
+            <p:ph type="sldNum" sz="quarter" idx="10"/>
+          </p:nvPr>
+        </p:nvSpPr>
+        <p:spPr/>
+        <p:txBody>
+          <a:bodyPr/>
+          <a:lstStyle/>
+          <a:p>
+            <a:fld id="{A6297769-1C72-4A44-9625-ED38B62D33BE}" type="slidenum">
+              <a:rPr lang="en-US" smtClean="0"/>
+              <a:t>34</a:t>
+            </a:fld>
+            <a:endParaRPr lang="en-US"/>
+          </a:p>
+        </p:txBody>
+      </p:sp>
+    </p:spTree>
+    <p:extLst>
+      <p:ext uri="{BB962C8B-B14F-4D97-AF65-F5344CB8AC3E}">
+        <p14:creationId xmlns:p14="http://schemas.microsoft.com/office/powerpoint/2010/main" val="486308606"/>
+      </p:ext>
+    </p:extLst>
+  </p:cSld>
+  <p:clrMapOvr>
+    <a:masterClrMapping/>
+  </p:clrMapOvr>
+</p:notes>
+</file>
+
+<file path=ppt/notesSlides/notesSlide28.xml><?xml version="1.0" encoding="utf-8"?>
+<p:notes xmlns:a="http://schemas.openxmlformats.org/drawingml/2006/main" xmlns:r="http://schemas.openxmlformats.org/officeDocument/2006/relationships" xmlns:p="http://schemas.openxmlformats.org/presentationml/2006/main">
+  <p:cSld>
+    <p:spTree>
+      <p:nvGrpSpPr>
+        <p:cNvPr id="1" name=""/>
+        <p:cNvGrpSpPr/>
+        <p:nvPr/>
+      </p:nvGrpSpPr>
+      <p:grpSpPr>
+        <a:xfrm>
+          <a:off x="0" y="0"/>
+          <a:ext cx="0" cy="0"/>
+          <a:chOff x="0" y="0"/>
+          <a:chExt cx="0" cy="0"/>
+        </a:xfrm>
+      </p:grpSpPr>
+      <p:sp>
+        <p:nvSpPr>
+          <p:cNvPr id="2" name="Slide Image Placeholder 1"/>
+          <p:cNvSpPr>
+            <a:spLocks noGrp="1" noRot="1" noChangeAspect="1"/>
+          </p:cNvSpPr>
+          <p:nvPr>
+            <p:ph type="sldImg"/>
+          </p:nvPr>
+        </p:nvSpPr>
+        <p:spPr/>
+      </p:sp>
+      <p:sp>
+        <p:nvSpPr>
+          <p:cNvPr id="3" name="Notes Placeholder 2"/>
+          <p:cNvSpPr>
+            <a:spLocks noGrp="1"/>
+          </p:cNvSpPr>
+          <p:nvPr>
+            <p:ph type="body" idx="1"/>
+          </p:nvPr>
+        </p:nvSpPr>
+        <p:spPr/>
+        <p:txBody>
+          <a:bodyPr/>
+          <a:lstStyle/>
+          <a:p>
+            <a:pPr algn="r" rtl="1"/>
+            <a:r>
+              <a:rPr lang="en-US" dirty="0" err="1" smtClean="0"/>
+              <a:t>Andicator</a:t>
+            </a:r>
+            <a:r>
+              <a:rPr lang="fa-IR" dirty="0" smtClean="0"/>
+              <a:t>هایی</a:t>
+            </a:r>
+            <a:r>
+              <a:rPr lang="fa-IR" baseline="0" dirty="0" smtClean="0"/>
+              <a:t> مثل </a:t>
+            </a:r>
+            <a:r>
+              <a:rPr lang="en-US" baseline="0" dirty="0" smtClean="0"/>
+              <a:t>MACD</a:t>
+            </a:r>
+            <a:r>
+              <a:rPr lang="fa-IR" baseline="0" dirty="0" smtClean="0"/>
+              <a:t> و </a:t>
+            </a:r>
+            <a:r>
+              <a:rPr lang="en-US" baseline="0" dirty="0" smtClean="0"/>
+              <a:t>RSI</a:t>
+            </a:r>
+            <a:r>
+              <a:rPr lang="fa-IR" baseline="0" dirty="0" smtClean="0"/>
+              <a:t> هستند بعضا واگرایی نشون میدن که دو نوع داره:</a:t>
+            </a:r>
+          </a:p>
+          <a:p>
+            <a:pPr algn="r" rtl="1"/>
+            <a:r>
+              <a:rPr lang="fa-IR" baseline="0" dirty="0" smtClean="0"/>
+              <a:t>1- کلاسیک (معمولی): اگر روند قیمت نزولی بود، دوتا </a:t>
+            </a:r>
+            <a:r>
+              <a:rPr lang="en-US" baseline="0" dirty="0" smtClean="0"/>
+              <a:t>higher high</a:t>
+            </a:r>
+            <a:r>
+              <a:rPr lang="fa-IR" baseline="0" dirty="0" smtClean="0"/>
+              <a:t> </a:t>
+            </a:r>
+            <a:r>
+              <a:rPr lang="fa-IR" baseline="0" dirty="0" smtClean="0"/>
+              <a:t>به هم وصلشون میکنیم. در صورتی که روند </a:t>
+            </a:r>
+            <a:r>
+              <a:rPr lang="en-US" baseline="0" dirty="0" smtClean="0"/>
+              <a:t>indicator</a:t>
+            </a:r>
+            <a:r>
+              <a:rPr lang="fa-IR" baseline="0" dirty="0" smtClean="0"/>
+              <a:t> (مثلا </a:t>
+            </a:r>
+            <a:r>
+              <a:rPr lang="en-US" baseline="0" dirty="0" smtClean="0"/>
+              <a:t>MACD</a:t>
+            </a:r>
+            <a:r>
+              <a:rPr lang="fa-IR" baseline="0" dirty="0" smtClean="0"/>
+              <a:t>) صعودی باشه و </a:t>
+            </a:r>
+            <a:r>
+              <a:rPr lang="en-US" baseline="0" dirty="0" smtClean="0"/>
+              <a:t>Price</a:t>
+            </a:r>
+            <a:r>
+              <a:rPr lang="fa-IR" baseline="0" dirty="0" smtClean="0"/>
+              <a:t> نزولی باشد، یعنی اگر جهت شیبشون برابر نبود از این نوع است. در این نوع حرف </a:t>
+            </a:r>
+            <a:r>
+              <a:rPr lang="en-US" baseline="0" dirty="0" err="1" smtClean="0"/>
+              <a:t>andicator</a:t>
+            </a:r>
+            <a:r>
+              <a:rPr lang="fa-IR" baseline="0" dirty="0" smtClean="0"/>
+              <a:t> رو گوش می‌کنیم. کاربرد برای خروج از </a:t>
+            </a:r>
+            <a:r>
+              <a:rPr lang="en-US" baseline="0" dirty="0" smtClean="0"/>
+              <a:t>position</a:t>
+            </a:r>
+            <a:r>
+              <a:rPr lang="fa-IR" baseline="0" dirty="0" smtClean="0"/>
+              <a:t>.</a:t>
+            </a:r>
+            <a:endParaRPr lang="fa-IR" baseline="0" dirty="0" smtClean="0"/>
+          </a:p>
+          <a:p>
+            <a:pPr algn="r" rtl="1"/>
+            <a:r>
+              <a:rPr lang="fa-IR" baseline="0" dirty="0" smtClean="0"/>
+              <a:t>2- </a:t>
+            </a:r>
+            <a:r>
+              <a:rPr lang="en-US" baseline="0" dirty="0" smtClean="0"/>
+              <a:t>Hidden</a:t>
+            </a:r>
+            <a:r>
+              <a:rPr lang="fa-IR" baseline="0" dirty="0" smtClean="0"/>
+              <a:t>: اگر روند نزولی بود دو تا </a:t>
+            </a:r>
+            <a:r>
+              <a:rPr lang="en-US" baseline="0" dirty="0" smtClean="0"/>
+              <a:t>lower low</a:t>
+            </a:r>
+            <a:r>
+              <a:rPr lang="fa-IR" baseline="0" dirty="0" smtClean="0"/>
+              <a:t> رو میگیرم و به هم وصلشون میکنیم. </a:t>
+            </a:r>
+            <a:r>
+              <a:rPr lang="fa-IR" baseline="0" dirty="0" smtClean="0"/>
+              <a:t>در صورتی که روند </a:t>
+            </a:r>
+            <a:r>
+              <a:rPr lang="en-US" baseline="0" dirty="0" smtClean="0"/>
+              <a:t>indicator</a:t>
+            </a:r>
+            <a:r>
+              <a:rPr lang="fa-IR" baseline="0" dirty="0" smtClean="0"/>
+              <a:t> (مثلا </a:t>
+            </a:r>
+            <a:r>
+              <a:rPr lang="en-US" baseline="0" dirty="0" smtClean="0"/>
+              <a:t>MACD</a:t>
+            </a:r>
+            <a:r>
+              <a:rPr lang="fa-IR" baseline="0" dirty="0" smtClean="0"/>
+              <a:t>) نزولی باشه و </a:t>
+            </a:r>
+            <a:r>
+              <a:rPr lang="en-US" baseline="0" dirty="0" smtClean="0"/>
+              <a:t>Price</a:t>
+            </a:r>
+            <a:r>
+              <a:rPr lang="fa-IR" baseline="0" dirty="0" smtClean="0"/>
+              <a:t> صعودی باشد، یعنی اگر جهت شیبشون برعکس باشه از این نوع است</a:t>
+            </a:r>
+            <a:r>
+              <a:rPr lang="fa-IR" baseline="0" dirty="0" smtClean="0"/>
+              <a:t>. در اینجا حرف قیمت رو گوش می‌کنیم. کاربرد برای ماندن در </a:t>
+            </a:r>
+            <a:r>
+              <a:rPr lang="en-US" baseline="0" dirty="0" smtClean="0"/>
+              <a:t>position</a:t>
+            </a:r>
+            <a:r>
+              <a:rPr lang="fa-IR" baseline="0" dirty="0" smtClean="0"/>
+              <a:t>. </a:t>
+            </a:r>
+            <a:endParaRPr lang="en-US" dirty="0"/>
+          </a:p>
+        </p:txBody>
+      </p:sp>
+      <p:sp>
+        <p:nvSpPr>
+          <p:cNvPr id="4" name="Slide Number Placeholder 3"/>
+          <p:cNvSpPr>
+            <a:spLocks noGrp="1"/>
+          </p:cNvSpPr>
+          <p:nvPr>
+            <p:ph type="sldNum" sz="quarter" idx="10"/>
+          </p:nvPr>
+        </p:nvSpPr>
+        <p:spPr/>
+        <p:txBody>
+          <a:bodyPr/>
+          <a:lstStyle/>
+          <a:p>
+            <a:fld id="{A6297769-1C72-4A44-9625-ED38B62D33BE}" type="slidenum">
+              <a:rPr lang="en-US" smtClean="0"/>
+              <a:t>35</a:t>
+            </a:fld>
+            <a:endParaRPr lang="en-US"/>
+          </a:p>
+        </p:txBody>
+      </p:sp>
+    </p:spTree>
+    <p:extLst>
+      <p:ext uri="{BB962C8B-B14F-4D97-AF65-F5344CB8AC3E}">
+        <p14:creationId xmlns:p14="http://schemas.microsoft.com/office/powerpoint/2010/main" val="665881754"/>
+      </p:ext>
+    </p:extLst>
+  </p:cSld>
+  <p:clrMapOvr>
+    <a:masterClrMapping/>
+  </p:clrMapOvr>
+</p:notes>
+</file>
+
+<file path=ppt/notesSlides/notesSlide29.xml><?xml version="1.0" encoding="utf-8"?>
+<p:notes xmlns:a="http://schemas.openxmlformats.org/drawingml/2006/main" xmlns:r="http://schemas.openxmlformats.org/officeDocument/2006/relationships" xmlns:p="http://schemas.openxmlformats.org/presentationml/2006/main">
+  <p:cSld>
+    <p:spTree>
+      <p:nvGrpSpPr>
+        <p:cNvPr id="1" name=""/>
+        <p:cNvGrpSpPr/>
+        <p:nvPr/>
+      </p:nvGrpSpPr>
+      <p:grpSpPr>
+        <a:xfrm>
+          <a:off x="0" y="0"/>
+          <a:ext cx="0" cy="0"/>
+          <a:chOff x="0" y="0"/>
+          <a:chExt cx="0" cy="0"/>
+        </a:xfrm>
+      </p:grpSpPr>
+      <p:sp>
+        <p:nvSpPr>
+          <p:cNvPr id="2" name="Slide Image Placeholder 1"/>
+          <p:cNvSpPr>
+            <a:spLocks noGrp="1" noRot="1" noChangeAspect="1"/>
+          </p:cNvSpPr>
+          <p:nvPr>
+            <p:ph type="sldImg"/>
+          </p:nvPr>
+        </p:nvSpPr>
+        <p:spPr/>
+      </p:sp>
+      <p:sp>
+        <p:nvSpPr>
+          <p:cNvPr id="3" name="Notes Placeholder 2"/>
+          <p:cNvSpPr>
+            <a:spLocks noGrp="1"/>
+          </p:cNvSpPr>
+          <p:nvPr>
+            <p:ph type="body" idx="1"/>
+          </p:nvPr>
+        </p:nvSpPr>
+        <p:spPr/>
+        <p:txBody>
+          <a:bodyPr/>
+          <a:lstStyle/>
+          <a:p>
+            <a:pPr algn="r" rtl="1"/>
+            <a:r>
+              <a:rPr lang="fa-IR" dirty="0" smtClean="0"/>
+              <a:t>چیموکو:</a:t>
+            </a:r>
+            <a:r>
+              <a:rPr lang="fa-IR" baseline="0" dirty="0" smtClean="0"/>
+              <a:t> براساس </a:t>
+            </a:r>
+            <a:r>
+              <a:rPr lang="en-US" baseline="0" dirty="0" smtClean="0"/>
+              <a:t>MA</a:t>
+            </a:r>
+            <a:r>
+              <a:rPr lang="fa-IR" baseline="0" dirty="0" smtClean="0"/>
+              <a:t> است. </a:t>
+            </a:r>
+          </a:p>
+          <a:p>
+            <a:pPr algn="r" rtl="1"/>
+            <a:endParaRPr lang="fa-IR" dirty="0" smtClean="0"/>
+          </a:p>
+        </p:txBody>
+      </p:sp>
+      <p:sp>
+        <p:nvSpPr>
+          <p:cNvPr id="4" name="Slide Number Placeholder 3"/>
+          <p:cNvSpPr>
+            <a:spLocks noGrp="1"/>
+          </p:cNvSpPr>
+          <p:nvPr>
+            <p:ph type="sldNum" sz="quarter" idx="10"/>
+          </p:nvPr>
+        </p:nvSpPr>
+        <p:spPr/>
+        <p:txBody>
+          <a:bodyPr/>
+          <a:lstStyle/>
+          <a:p>
+            <a:fld id="{A6297769-1C72-4A44-9625-ED38B62D33BE}" type="slidenum">
+              <a:rPr lang="en-US" smtClean="0"/>
+              <a:t>40</a:t>
+            </a:fld>
+            <a:endParaRPr lang="en-US"/>
+          </a:p>
+        </p:txBody>
+      </p:sp>
+    </p:spTree>
+    <p:extLst>
+      <p:ext uri="{BB962C8B-B14F-4D97-AF65-F5344CB8AC3E}">
+        <p14:creationId xmlns:p14="http://schemas.microsoft.com/office/powerpoint/2010/main" val="3178533177"/>
       </p:ext>
     </p:extLst>
   </p:cSld>
@@ -1763,6 +3580,449 @@
     <p:extLst>
       <p:ext uri="{BB962C8B-B14F-4D97-AF65-F5344CB8AC3E}">
         <p14:creationId xmlns:p14="http://schemas.microsoft.com/office/powerpoint/2010/main" val="2110267299"/>
+      </p:ext>
+    </p:extLst>
+  </p:cSld>
+  <p:clrMapOvr>
+    <a:masterClrMapping/>
+  </p:clrMapOvr>
+</p:notes>
+</file>
+
+<file path=ppt/notesSlides/notesSlide30.xml><?xml version="1.0" encoding="utf-8"?>
+<p:notes xmlns:a="http://schemas.openxmlformats.org/drawingml/2006/main" xmlns:r="http://schemas.openxmlformats.org/officeDocument/2006/relationships" xmlns:p="http://schemas.openxmlformats.org/presentationml/2006/main">
+  <p:cSld>
+    <p:spTree>
+      <p:nvGrpSpPr>
+        <p:cNvPr id="1" name=""/>
+        <p:cNvGrpSpPr/>
+        <p:nvPr/>
+      </p:nvGrpSpPr>
+      <p:grpSpPr>
+        <a:xfrm>
+          <a:off x="0" y="0"/>
+          <a:ext cx="0" cy="0"/>
+          <a:chOff x="0" y="0"/>
+          <a:chExt cx="0" cy="0"/>
+        </a:xfrm>
+      </p:grpSpPr>
+      <p:sp>
+        <p:nvSpPr>
+          <p:cNvPr id="2" name="Slide Image Placeholder 1"/>
+          <p:cNvSpPr>
+            <a:spLocks noGrp="1" noRot="1" noChangeAspect="1"/>
+          </p:cNvSpPr>
+          <p:nvPr>
+            <p:ph type="sldImg"/>
+          </p:nvPr>
+        </p:nvSpPr>
+        <p:spPr/>
+      </p:sp>
+      <p:sp>
+        <p:nvSpPr>
+          <p:cNvPr id="3" name="Notes Placeholder 2"/>
+          <p:cNvSpPr>
+            <a:spLocks noGrp="1"/>
+          </p:cNvSpPr>
+          <p:nvPr>
+            <p:ph type="body" idx="1"/>
+          </p:nvPr>
+        </p:nvSpPr>
+        <p:spPr/>
+        <p:txBody>
+          <a:bodyPr/>
+          <a:lstStyle/>
+          <a:p>
+            <a:pPr algn="r" rtl="1"/>
+            <a:r>
+              <a:rPr lang="fa-IR" dirty="0" smtClean="0"/>
+              <a:t>5 تا خط داره که میانگین</a:t>
+            </a:r>
+            <a:r>
+              <a:rPr lang="fa-IR" baseline="0" dirty="0" smtClean="0"/>
+              <a:t> 26 روزه و 9 روزه رو حساب میکنه بعد از اونا هم میانگین میگیره.</a:t>
+            </a:r>
+            <a:endParaRPr lang="en-US" dirty="0"/>
+          </a:p>
+        </p:txBody>
+      </p:sp>
+      <p:sp>
+        <p:nvSpPr>
+          <p:cNvPr id="4" name="Slide Number Placeholder 3"/>
+          <p:cNvSpPr>
+            <a:spLocks noGrp="1"/>
+          </p:cNvSpPr>
+          <p:nvPr>
+            <p:ph type="sldNum" sz="quarter" idx="10"/>
+          </p:nvPr>
+        </p:nvSpPr>
+        <p:spPr/>
+        <p:txBody>
+          <a:bodyPr/>
+          <a:lstStyle/>
+          <a:p>
+            <a:fld id="{A6297769-1C72-4A44-9625-ED38B62D33BE}" type="slidenum">
+              <a:rPr lang="en-US" smtClean="0"/>
+              <a:t>41</a:t>
+            </a:fld>
+            <a:endParaRPr lang="en-US"/>
+          </a:p>
+        </p:txBody>
+      </p:sp>
+    </p:spTree>
+    <p:extLst>
+      <p:ext uri="{BB962C8B-B14F-4D97-AF65-F5344CB8AC3E}">
+        <p14:creationId xmlns:p14="http://schemas.microsoft.com/office/powerpoint/2010/main" val="325329546"/>
+      </p:ext>
+    </p:extLst>
+  </p:cSld>
+  <p:clrMapOvr>
+    <a:masterClrMapping/>
+  </p:clrMapOvr>
+</p:notes>
+</file>
+
+<file path=ppt/notesSlides/notesSlide31.xml><?xml version="1.0" encoding="utf-8"?>
+<p:notes xmlns:a="http://schemas.openxmlformats.org/drawingml/2006/main" xmlns:r="http://schemas.openxmlformats.org/officeDocument/2006/relationships" xmlns:p="http://schemas.openxmlformats.org/presentationml/2006/main">
+  <p:cSld>
+    <p:spTree>
+      <p:nvGrpSpPr>
+        <p:cNvPr id="1" name=""/>
+        <p:cNvGrpSpPr/>
+        <p:nvPr/>
+      </p:nvGrpSpPr>
+      <p:grpSpPr>
+        <a:xfrm>
+          <a:off x="0" y="0"/>
+          <a:ext cx="0" cy="0"/>
+          <a:chOff x="0" y="0"/>
+          <a:chExt cx="0" cy="0"/>
+        </a:xfrm>
+      </p:grpSpPr>
+      <p:sp>
+        <p:nvSpPr>
+          <p:cNvPr id="2" name="Slide Image Placeholder 1"/>
+          <p:cNvSpPr>
+            <a:spLocks noGrp="1" noRot="1" noChangeAspect="1"/>
+          </p:cNvSpPr>
+          <p:nvPr>
+            <p:ph type="sldImg"/>
+          </p:nvPr>
+        </p:nvSpPr>
+        <p:spPr/>
+      </p:sp>
+      <p:sp>
+        <p:nvSpPr>
+          <p:cNvPr id="3" name="Notes Placeholder 2"/>
+          <p:cNvSpPr>
+            <a:spLocks noGrp="1"/>
+          </p:cNvSpPr>
+          <p:nvPr>
+            <p:ph type="body" idx="1"/>
+          </p:nvPr>
+        </p:nvSpPr>
+        <p:spPr/>
+        <p:txBody>
+          <a:bodyPr/>
+          <a:lstStyle/>
+          <a:p>
+            <a:pPr algn="r" rtl="1"/>
+            <a:r>
+              <a:rPr lang="en-US" dirty="0" smtClean="0"/>
+              <a:t>Conversion</a:t>
+            </a:r>
+            <a:r>
+              <a:rPr lang="en-US" baseline="0" dirty="0" smtClean="0"/>
+              <a:t> line</a:t>
+            </a:r>
+            <a:r>
+              <a:rPr lang="fa-IR" baseline="0" dirty="0" smtClean="0"/>
+              <a:t>: </a:t>
+            </a:r>
+            <a:r>
+              <a:rPr lang="en-US" baseline="0" dirty="0" smtClean="0"/>
+              <a:t>highest high</a:t>
+            </a:r>
+            <a:r>
+              <a:rPr lang="fa-IR" baseline="0" dirty="0" smtClean="0"/>
+              <a:t> و </a:t>
+            </a:r>
+            <a:r>
+              <a:rPr lang="en-US" baseline="0" dirty="0" smtClean="0"/>
+              <a:t>lowest low</a:t>
+            </a:r>
+            <a:r>
+              <a:rPr lang="fa-IR" baseline="0" dirty="0" smtClean="0"/>
+              <a:t> رو در 9 روز گذشته پیدا میکنیم و میانگین میگیریم.</a:t>
+            </a:r>
+          </a:p>
+          <a:p>
+            <a:pPr algn="r" rtl="1"/>
+            <a:r>
+              <a:rPr lang="fa-IR" baseline="0" dirty="0" smtClean="0"/>
+              <a:t>بعدیا هم به همین ترتیب و 5 خط پیدا میکنیم. این 5 خط به عنوان حمایت‌ها و مقاومت‌ها عمل میکنند.</a:t>
+            </a:r>
+          </a:p>
+        </p:txBody>
+      </p:sp>
+      <p:sp>
+        <p:nvSpPr>
+          <p:cNvPr id="4" name="Slide Number Placeholder 3"/>
+          <p:cNvSpPr>
+            <a:spLocks noGrp="1"/>
+          </p:cNvSpPr>
+          <p:nvPr>
+            <p:ph type="sldNum" sz="quarter" idx="10"/>
+          </p:nvPr>
+        </p:nvSpPr>
+        <p:spPr/>
+        <p:txBody>
+          <a:bodyPr/>
+          <a:lstStyle/>
+          <a:p>
+            <a:fld id="{A6297769-1C72-4A44-9625-ED38B62D33BE}" type="slidenum">
+              <a:rPr lang="en-US" smtClean="0"/>
+              <a:t>42</a:t>
+            </a:fld>
+            <a:endParaRPr lang="en-US"/>
+          </a:p>
+        </p:txBody>
+      </p:sp>
+    </p:spTree>
+    <p:extLst>
+      <p:ext uri="{BB962C8B-B14F-4D97-AF65-F5344CB8AC3E}">
+        <p14:creationId xmlns:p14="http://schemas.microsoft.com/office/powerpoint/2010/main" val="1740590141"/>
+      </p:ext>
+    </p:extLst>
+  </p:cSld>
+  <p:clrMapOvr>
+    <a:masterClrMapping/>
+  </p:clrMapOvr>
+</p:notes>
+</file>
+
+<file path=ppt/notesSlides/notesSlide32.xml><?xml version="1.0" encoding="utf-8"?>
+<p:notes xmlns:a="http://schemas.openxmlformats.org/drawingml/2006/main" xmlns:r="http://schemas.openxmlformats.org/officeDocument/2006/relationships" xmlns:p="http://schemas.openxmlformats.org/presentationml/2006/main">
+  <p:cSld>
+    <p:spTree>
+      <p:nvGrpSpPr>
+        <p:cNvPr id="1" name=""/>
+        <p:cNvGrpSpPr/>
+        <p:nvPr/>
+      </p:nvGrpSpPr>
+      <p:grpSpPr>
+        <a:xfrm>
+          <a:off x="0" y="0"/>
+          <a:ext cx="0" cy="0"/>
+          <a:chOff x="0" y="0"/>
+          <a:chExt cx="0" cy="0"/>
+        </a:xfrm>
+      </p:grpSpPr>
+      <p:sp>
+        <p:nvSpPr>
+          <p:cNvPr id="2" name="Slide Image Placeholder 1"/>
+          <p:cNvSpPr>
+            <a:spLocks noGrp="1" noRot="1" noChangeAspect="1"/>
+          </p:cNvSpPr>
+          <p:nvPr>
+            <p:ph type="sldImg"/>
+          </p:nvPr>
+        </p:nvSpPr>
+        <p:spPr/>
+      </p:sp>
+      <p:sp>
+        <p:nvSpPr>
+          <p:cNvPr id="3" name="Notes Placeholder 2"/>
+          <p:cNvSpPr>
+            <a:spLocks noGrp="1"/>
+          </p:cNvSpPr>
+          <p:nvPr>
+            <p:ph type="body" idx="1"/>
+          </p:nvPr>
+        </p:nvSpPr>
+        <p:spPr/>
+        <p:txBody>
+          <a:bodyPr/>
+          <a:lstStyle/>
+          <a:p>
+            <a:pPr algn="r" rtl="1"/>
+            <a:r>
+              <a:rPr lang="fa-IR" baseline="0" dirty="0" smtClean="0"/>
+              <a:t>اگر </a:t>
+            </a:r>
+            <a:r>
+              <a:rPr lang="en-US" baseline="0" dirty="0" smtClean="0"/>
+              <a:t>leading span A</a:t>
+            </a:r>
+            <a:r>
+              <a:rPr lang="fa-IR" baseline="0" dirty="0" smtClean="0"/>
+              <a:t> بالاتر از </a:t>
+            </a:r>
+            <a:r>
+              <a:rPr lang="en-US" baseline="0" dirty="0" smtClean="0"/>
+              <a:t>leading span B</a:t>
+            </a:r>
+            <a:r>
+              <a:rPr lang="fa-IR" baseline="0" dirty="0" smtClean="0"/>
+              <a:t> باشه، رنگ بینشون سبز میشه و </a:t>
+            </a:r>
+            <a:r>
+              <a:rPr lang="en-US" baseline="0" dirty="0" smtClean="0"/>
+              <a:t>uptrend</a:t>
+            </a:r>
+            <a:r>
+              <a:rPr lang="fa-IR" baseline="0" dirty="0" smtClean="0"/>
+              <a:t> رو تایید میکنه. در حالت بالعکس رنگ ابر قرمز میشه.</a:t>
+            </a:r>
+            <a:endParaRPr lang="en-US" baseline="0" dirty="0" smtClean="0"/>
+          </a:p>
+          <a:p>
+            <a:pPr algn="r" rtl="1"/>
+            <a:r>
+              <a:rPr lang="fa-IR" baseline="0" dirty="0" smtClean="0"/>
+              <a:t>اگر </a:t>
+            </a:r>
+            <a:r>
+              <a:rPr lang="en-US" baseline="0" dirty="0" smtClean="0"/>
+              <a:t>CL</a:t>
+            </a:r>
+            <a:r>
+              <a:rPr lang="fa-IR" baseline="0" dirty="0" smtClean="0"/>
+              <a:t> بالاتر از </a:t>
+            </a:r>
+            <a:r>
+              <a:rPr lang="en-US" baseline="0" dirty="0" smtClean="0"/>
+              <a:t>Base line</a:t>
+            </a:r>
+            <a:r>
+              <a:rPr lang="fa-IR" baseline="0" dirty="0" smtClean="0"/>
+              <a:t> مثل </a:t>
+            </a:r>
+            <a:r>
+              <a:rPr lang="en-US" baseline="0" dirty="0" smtClean="0"/>
+              <a:t>moving</a:t>
+            </a:r>
+            <a:r>
+              <a:rPr lang="fa-IR" baseline="0" dirty="0" smtClean="0"/>
+              <a:t>ها حالت صعودی رو نشون میده. اگر </a:t>
+            </a:r>
+            <a:r>
+              <a:rPr lang="en-US" baseline="0" dirty="0" smtClean="0"/>
+              <a:t>cross</a:t>
+            </a:r>
+            <a:r>
+              <a:rPr lang="fa-IR" baseline="0" dirty="0" smtClean="0"/>
+              <a:t> اتفاق بیفته حالت نزولی رو نشون میده. </a:t>
+            </a:r>
+            <a:endParaRPr lang="fa-IR" baseline="0" dirty="0"/>
+          </a:p>
+          <a:p>
+            <a:pPr algn="r" rtl="1"/>
+            <a:r>
+              <a:rPr lang="fa-IR" baseline="0" dirty="0" smtClean="0"/>
+              <a:t>- سیگنال‌های صعودی رو وقتی بالا ابر سبز هستیم در نظر میگیریم و سیگنال‌های نزولی رو وقتی پایین ابر قرمز هستیم در نظر میگیریم.</a:t>
+            </a:r>
+          </a:p>
+          <a:p>
+            <a:pPr marL="171450" indent="-171450" algn="r" rtl="1">
+              <a:buFontTx/>
+              <a:buChar char="-"/>
+            </a:pPr>
+            <a:r>
+              <a:rPr lang="fa-IR" baseline="0" dirty="0" smtClean="0"/>
+              <a:t>لبه‌های ابر و </a:t>
+            </a:r>
+            <a:r>
+              <a:rPr lang="en-US" baseline="0" dirty="0" smtClean="0"/>
+              <a:t>CL</a:t>
+            </a:r>
+            <a:r>
+              <a:rPr lang="fa-IR" baseline="0" dirty="0" smtClean="0"/>
+              <a:t> و </a:t>
+            </a:r>
+            <a:r>
+              <a:rPr lang="en-US" baseline="0" dirty="0" smtClean="0"/>
+              <a:t>BL</a:t>
+            </a:r>
+            <a:r>
+              <a:rPr lang="fa-IR" baseline="0" dirty="0" smtClean="0"/>
+              <a:t> مقاومت و حمایت هستند. </a:t>
+            </a:r>
+            <a:endParaRPr lang="en-US" baseline="0" dirty="0" smtClean="0"/>
+          </a:p>
+          <a:p>
+            <a:pPr marL="171450" indent="-171450" algn="r" rtl="1">
+              <a:buFontTx/>
+              <a:buChar char="-"/>
+            </a:pPr>
+            <a:endParaRPr lang="fa-IR" baseline="0" dirty="0" smtClean="0"/>
+          </a:p>
+          <a:p>
+            <a:pPr marL="0" indent="0" algn="r" rtl="1">
+              <a:buFontTx/>
+              <a:buNone/>
+            </a:pPr>
+            <a:r>
+              <a:rPr lang="en-US" baseline="0" dirty="0" smtClean="0"/>
+              <a:t>CL</a:t>
+            </a:r>
+            <a:r>
+              <a:rPr lang="fa-IR" baseline="0" dirty="0" smtClean="0"/>
+              <a:t>: </a:t>
+            </a:r>
+            <a:r>
+              <a:rPr lang="en-US" baseline="0" dirty="0" smtClean="0"/>
+              <a:t>conversion line</a:t>
+            </a:r>
+          </a:p>
+          <a:p>
+            <a:pPr marL="0" indent="0" algn="r" rtl="1">
+              <a:buFontTx/>
+              <a:buNone/>
+            </a:pPr>
+            <a:r>
+              <a:rPr lang="en-US" baseline="0" dirty="0" smtClean="0"/>
+              <a:t>BL</a:t>
+            </a:r>
+            <a:r>
+              <a:rPr lang="fa-IR" baseline="0" dirty="0" smtClean="0"/>
+              <a:t>: </a:t>
+            </a:r>
+            <a:r>
+              <a:rPr lang="en-US" baseline="0" dirty="0" smtClean="0"/>
+              <a:t>base line</a:t>
+            </a:r>
+            <a:endParaRPr lang="fa-IR" baseline="0" dirty="0" smtClean="0"/>
+          </a:p>
+        </p:txBody>
+      </p:sp>
+      <p:sp>
+        <p:nvSpPr>
+          <p:cNvPr id="4" name="Slide Number Placeholder 3"/>
+          <p:cNvSpPr>
+            <a:spLocks noGrp="1"/>
+          </p:cNvSpPr>
+          <p:nvPr>
+            <p:ph type="sldNum" sz="quarter" idx="10"/>
+          </p:nvPr>
+        </p:nvSpPr>
+        <p:spPr/>
+        <p:txBody>
+          <a:bodyPr/>
+          <a:lstStyle/>
+          <a:p>
+            <a:fld id="{A6297769-1C72-4A44-9625-ED38B62D33BE}" type="slidenum">
+              <a:rPr lang="en-US" smtClean="0"/>
+              <a:t>44</a:t>
+            </a:fld>
+            <a:endParaRPr lang="en-US"/>
+          </a:p>
+        </p:txBody>
+      </p:sp>
+    </p:spTree>
+    <p:extLst>
+      <p:ext uri="{BB962C8B-B14F-4D97-AF65-F5344CB8AC3E}">
+        <p14:creationId xmlns:p14="http://schemas.microsoft.com/office/powerpoint/2010/main" val="4099648332"/>
       </p:ext>
     </p:extLst>
   </p:cSld>
@@ -18916,7 +21176,7 @@
           <p:nvPr/>
         </p:nvPicPr>
         <p:blipFill>
-          <a:blip r:embed="rId2" cstate="print"/>
+          <a:blip r:embed="rId3" cstate="print"/>
           <a:stretch>
             <a:fillRect/>
           </a:stretch>
@@ -20798,6 +23058,13 @@
   <p:clrMapOvr>
     <a:masterClrMapping/>
   </p:clrMapOvr>
+  <p:timing>
+    <p:tnLst>
+      <p:par>
+        <p:cTn id="1" dur="indefinite" restart="never" nodeType="tmRoot"/>
+      </p:par>
+    </p:tnLst>
+  </p:timing>
 </p:sld>
 </file>
 
@@ -21000,6 +23267,13 @@
   <p:clrMapOvr>
     <a:masterClrMapping/>
   </p:clrMapOvr>
+  <p:timing>
+    <p:tnLst>
+      <p:par>
+        <p:cTn id="1" dur="indefinite" restart="never" nodeType="tmRoot"/>
+      </p:par>
+    </p:tnLst>
+  </p:timing>
 </p:sld>
 </file>
 
@@ -21292,7 +23566,7 @@
               </a:rPr>
               <a:t>time.</a:t>
             </a:r>
-            <a:endParaRPr sz="2200">
+            <a:endParaRPr sz="2200" dirty="0">
               <a:latin typeface="Calibri"/>
               <a:cs typeface="Calibri"/>
             </a:endParaRPr>
@@ -21599,7 +23873,7 @@
               </a:rPr>
               <a:t>decisions.</a:t>
             </a:r>
-            <a:endParaRPr sz="2200">
+            <a:endParaRPr sz="2200" dirty="0">
               <a:latin typeface="Calibri"/>
               <a:cs typeface="Calibri"/>
             </a:endParaRPr>
@@ -21852,7 +24126,7 @@
               </a:rPr>
               <a:t>healthy.</a:t>
             </a:r>
-            <a:endParaRPr sz="2200">
+            <a:endParaRPr sz="2200" dirty="0">
               <a:latin typeface="Calibri"/>
               <a:cs typeface="Calibri"/>
             </a:endParaRPr>
@@ -22013,7 +24287,7 @@
               </a:rPr>
               <a:t>.</a:t>
             </a:r>
-            <a:endParaRPr sz="2200">
+            <a:endParaRPr sz="2200" dirty="0">
               <a:latin typeface="Calibri"/>
               <a:cs typeface="Calibri"/>
             </a:endParaRPr>
@@ -22322,7 +24596,7 @@
               </a:rPr>
               <a:t>shape.</a:t>
             </a:r>
-            <a:endParaRPr sz="2200">
+            <a:endParaRPr sz="2200" dirty="0">
               <a:latin typeface="Calibri"/>
               <a:cs typeface="Calibri"/>
             </a:endParaRPr>
@@ -22334,6 +24608,13 @@
   <p:clrMapOvr>
     <a:masterClrMapping/>
   </p:clrMapOvr>
+  <p:timing>
+    <p:tnLst>
+      <p:par>
+        <p:cTn id="1" dur="indefinite" restart="never" nodeType="tmRoot"/>
+      </p:par>
+    </p:tnLst>
+  </p:timing>
 </p:sld>
 </file>
 
@@ -23888,6 +26169,13 @@
   <p:clrMapOvr>
     <a:masterClrMapping/>
   </p:clrMapOvr>
+  <p:timing>
+    <p:tnLst>
+      <p:par>
+        <p:cTn id="1" dur="indefinite" restart="never" nodeType="tmRoot"/>
+      </p:par>
+    </p:tnLst>
+  </p:timing>
 </p:sld>
 </file>
 
@@ -24034,6 +26322,13 @@
   <p:clrMapOvr>
     <a:masterClrMapping/>
   </p:clrMapOvr>
+  <p:timing>
+    <p:tnLst>
+      <p:par>
+        <p:cTn id="1" dur="indefinite" restart="never" nodeType="tmRoot"/>
+      </p:par>
+    </p:tnLst>
+  </p:timing>
 </p:sld>
 </file>
 
@@ -25434,6 +27729,13 @@
   <p:clrMapOvr>
     <a:masterClrMapping/>
   </p:clrMapOvr>
+  <p:timing>
+    <p:tnLst>
+      <p:par>
+        <p:cTn id="1" dur="indefinite" restart="never" nodeType="tmRoot"/>
+      </p:par>
+    </p:tnLst>
+  </p:timing>
 </p:sld>
 </file>
 
@@ -26644,7 +28946,7 @@
           <p:nvPr/>
         </p:nvPicPr>
         <p:blipFill>
-          <a:blip r:embed="rId2" cstate="print"/>
+          <a:blip r:embed="rId3" cstate="print"/>
           <a:stretch>
             <a:fillRect/>
           </a:stretch>
@@ -26698,6 +29000,13 @@
   <p:clrMapOvr>
     <a:masterClrMapping/>
   </p:clrMapOvr>
+  <p:timing>
+    <p:tnLst>
+      <p:par>
+        <p:cTn id="1" dur="indefinite" restart="never" nodeType="tmRoot"/>
+      </p:par>
+    </p:tnLst>
+  </p:timing>
 </p:sld>
 </file>
 
@@ -27735,7 +30044,7 @@
           <p:nvPr/>
         </p:nvPicPr>
         <p:blipFill>
-          <a:blip r:embed="rId2" cstate="print"/>
+          <a:blip r:embed="rId3" cstate="print"/>
           <a:stretch>
             <a:fillRect/>
           </a:stretch>
@@ -27789,6 +30098,13 @@
   <p:clrMapOvr>
     <a:masterClrMapping/>
   </p:clrMapOvr>
+  <p:timing>
+    <p:tnLst>
+      <p:par>
+        <p:cTn id="1" dur="indefinite" restart="never" nodeType="tmRoot"/>
+      </p:par>
+    </p:tnLst>
+  </p:timing>
 </p:sld>
 </file>
 
@@ -29202,7 +31518,7 @@
           <p:nvPr/>
         </p:nvPicPr>
         <p:blipFill>
-          <a:blip r:embed="rId2" cstate="print"/>
+          <a:blip r:embed="rId3" cstate="print"/>
           <a:stretch>
             <a:fillRect/>
           </a:stretch>
@@ -29256,6 +31572,13 @@
   <p:clrMapOvr>
     <a:masterClrMapping/>
   </p:clrMapOvr>
+  <p:timing>
+    <p:tnLst>
+      <p:par>
+        <p:cTn id="1" dur="indefinite" restart="never" nodeType="tmRoot"/>
+      </p:par>
+    </p:tnLst>
+  </p:timing>
 </p:sld>
 </file>
 
@@ -29428,7 +31751,7 @@
           <p:nvPr/>
         </p:nvPicPr>
         <p:blipFill>
-          <a:blip r:embed="rId2" cstate="print"/>
+          <a:blip r:embed="rId3" cstate="print"/>
           <a:stretch>
             <a:fillRect/>
           </a:stretch>
@@ -30462,6 +32785,13 @@
   <p:clrMapOvr>
     <a:masterClrMapping/>
   </p:clrMapOvr>
+  <p:timing>
+    <p:tnLst>
+      <p:par>
+        <p:cTn id="1" dur="indefinite" restart="never" nodeType="tmRoot"/>
+      </p:par>
+    </p:tnLst>
+  </p:timing>
 </p:sld>
 </file>
 
@@ -31747,6 +34077,13 @@
   <p:clrMapOvr>
     <a:masterClrMapping/>
   </p:clrMapOvr>
+  <p:timing>
+    <p:tnLst>
+      <p:par>
+        <p:cTn id="1" dur="indefinite" restart="never" nodeType="tmRoot"/>
+      </p:par>
+    </p:tnLst>
+  </p:timing>
 </p:sld>
 </file>
 
@@ -32321,7 +34658,7 @@
               </a:rPr>
               <a:t>data.</a:t>
             </a:r>
-            <a:endParaRPr sz="1700">
+            <a:endParaRPr sz="1700" dirty="0">
               <a:latin typeface="Calibri"/>
               <a:cs typeface="Calibri"/>
             </a:endParaRPr>
@@ -32498,7 +34835,7 @@
               </a:rPr>
               <a:t>.</a:t>
             </a:r>
-            <a:endParaRPr sz="1700">
+            <a:endParaRPr sz="1700" dirty="0">
               <a:latin typeface="Calibri"/>
               <a:cs typeface="Calibri"/>
             </a:endParaRPr>
@@ -32512,7 +34849,7 @@
           <p:nvPr/>
         </p:nvPicPr>
         <p:blipFill>
-          <a:blip r:embed="rId2" cstate="print"/>
+          <a:blip r:embed="rId3" cstate="print"/>
           <a:stretch>
             <a:fillRect/>
           </a:stretch>
@@ -32566,6 +34903,13 @@
   <p:clrMapOvr>
     <a:masterClrMapping/>
   </p:clrMapOvr>
+  <p:timing>
+    <p:tnLst>
+      <p:par>
+        <p:cTn id="1" dur="indefinite" restart="never" nodeType="tmRoot"/>
+      </p:par>
+    </p:tnLst>
+  </p:timing>
 </p:sld>
 </file>
 
@@ -32926,6 +35270,13 @@
   <p:clrMapOvr>
     <a:masterClrMapping/>
   </p:clrMapOvr>
+  <p:timing>
+    <p:tnLst>
+      <p:par>
+        <p:cTn id="1" dur="indefinite" restart="never" nodeType="tmRoot"/>
+      </p:par>
+    </p:tnLst>
+  </p:timing>
 </p:sld>
 </file>
 
@@ -33286,6 +35637,13 @@
   <p:clrMapOvr>
     <a:masterClrMapping/>
   </p:clrMapOvr>
+  <p:timing>
+    <p:tnLst>
+      <p:par>
+        <p:cTn id="1" dur="indefinite" restart="never" nodeType="tmRoot"/>
+      </p:par>
+    </p:tnLst>
+  </p:timing>
 </p:sld>
 </file>
 
@@ -33618,6 +35976,13 @@
   <p:clrMapOvr>
     <a:masterClrMapping/>
   </p:clrMapOvr>
+  <p:timing>
+    <p:tnLst>
+      <p:par>
+        <p:cTn id="1" dur="indefinite" restart="never" nodeType="tmRoot"/>
+      </p:par>
+    </p:tnLst>
+  </p:timing>
 </p:sld>
 </file>
 
@@ -33950,6 +36315,13 @@
   <p:clrMapOvr>
     <a:masterClrMapping/>
   </p:clrMapOvr>
+  <p:timing>
+    <p:tnLst>
+      <p:par>
+        <p:cTn id="1" dur="indefinite" restart="never" nodeType="tmRoot"/>
+      </p:par>
+    </p:tnLst>
+  </p:timing>
 </p:sld>
 </file>
 
@@ -37399,6 +39771,13 @@
   <p:clrMapOvr>
     <a:masterClrMapping/>
   </p:clrMapOvr>
+  <p:timing>
+    <p:tnLst>
+      <p:par>
+        <p:cTn id="1" dur="indefinite" restart="never" nodeType="tmRoot"/>
+      </p:par>
+    </p:tnLst>
+  </p:timing>
 </p:sld>
 </file>
 
@@ -39154,6 +41533,13 @@
   <p:clrMapOvr>
     <a:masterClrMapping/>
   </p:clrMapOvr>
+  <p:timing>
+    <p:tnLst>
+      <p:par>
+        <p:cTn id="1" dur="indefinite" restart="never" nodeType="tmRoot"/>
+      </p:par>
+    </p:tnLst>
+  </p:timing>
 </p:sld>
 </file>
 
@@ -39282,7 +41668,7 @@
           <p:nvPr/>
         </p:nvPicPr>
         <p:blipFill>
-          <a:blip r:embed="rId2" cstate="print"/>
+          <a:blip r:embed="rId3" cstate="print"/>
           <a:stretch>
             <a:fillRect/>
           </a:stretch>
@@ -39336,6 +41722,13 @@
   <p:clrMapOvr>
     <a:masterClrMapping/>
   </p:clrMapOvr>
+  <p:timing>
+    <p:tnLst>
+      <p:par>
+        <p:cTn id="1" dur="indefinite" restart="never" nodeType="tmRoot"/>
+      </p:par>
+    </p:tnLst>
+  </p:timing>
 </p:sld>
 </file>
 
@@ -39518,6 +41911,13 @@
   <p:clrMapOvr>
     <a:masterClrMapping/>
   </p:clrMapOvr>
+  <p:timing>
+    <p:tnLst>
+      <p:par>
+        <p:cTn id="1" dur="indefinite" restart="never" nodeType="tmRoot"/>
+      </p:par>
+    </p:tnLst>
+  </p:timing>
 </p:sld>
 </file>
 
@@ -42100,6 +44500,13 @@
   <p:clrMapOvr>
     <a:masterClrMapping/>
   </p:clrMapOvr>
+  <p:timing>
+    <p:tnLst>
+      <p:par>
+        <p:cTn id="1" dur="indefinite" restart="never" nodeType="tmRoot"/>
+      </p:par>
+    </p:tnLst>
+  </p:timing>
 </p:sld>
 </file>
 
@@ -42397,7 +44804,7 @@
               </a:rPr>
               <a:t>facilities</a:t>
             </a:r>
-            <a:endParaRPr sz="2800">
+            <a:endParaRPr sz="2800" dirty="0">
               <a:latin typeface="Calibri"/>
               <a:cs typeface="Calibri"/>
             </a:endParaRPr>
@@ -42434,7 +44841,7 @@
               </a:rPr>
               <a:t> indicators</a:t>
             </a:r>
-            <a:endParaRPr sz="2800">
+            <a:endParaRPr sz="2800" dirty="0">
               <a:latin typeface="Calibri"/>
               <a:cs typeface="Calibri"/>
             </a:endParaRPr>
@@ -42478,7 +44885,7 @@
               </a:rPr>
               <a:t>trading</a:t>
             </a:r>
-            <a:endParaRPr sz="2800">
+            <a:endParaRPr sz="2800" dirty="0">
               <a:latin typeface="Calibri"/>
               <a:cs typeface="Calibri"/>
             </a:endParaRPr>
@@ -42578,7 +44985,7 @@
               </a:rPr>
               <a:t>script</a:t>
             </a:r>
-            <a:endParaRPr sz="2800">
+            <a:endParaRPr sz="2800" dirty="0">
               <a:latin typeface="Calibri"/>
               <a:cs typeface="Calibri"/>
             </a:endParaRPr>
@@ -42622,7 +45029,7 @@
               </a:rPr>
               <a:t>backtesting</a:t>
             </a:r>
-            <a:endParaRPr sz="2800">
+            <a:endParaRPr sz="2800" dirty="0">
               <a:latin typeface="Calibri"/>
               <a:cs typeface="Calibri"/>
             </a:endParaRPr>
@@ -42634,6 +45041,13 @@
   <p:clrMapOvr>
     <a:masterClrMapping/>
   </p:clrMapOvr>
+  <p:timing>
+    <p:tnLst>
+      <p:par>
+        <p:cTn id="1" dur="indefinite" restart="never" nodeType="tmRoot"/>
+      </p:par>
+    </p:tnLst>
+  </p:timing>
 </p:sld>
 </file>
 

</xml_diff>